<commit_message>
Mostly finished powerpoint and set the stage to clean up code and develop py file.
</commit_message>
<xml_diff>
--- a/ppt/Covid Death Rates.pptx
+++ b/ppt/Covid Death Rates.pptx
@@ -5,7 +5,7 @@
     <p:sldMasterId id="2147483648" r:id="rId4"/>
   </p:sldMasterIdLst>
   <p:notesMasterIdLst>
-    <p:notesMasterId r:id="rId18"/>
+    <p:notesMasterId r:id="rId19"/>
   </p:notesMasterIdLst>
   <p:sldIdLst>
     <p:sldId id="256" r:id="rId5"/>
@@ -18,9 +18,10 @@
     <p:sldId id="284" r:id="rId12"/>
     <p:sldId id="285" r:id="rId13"/>
     <p:sldId id="286" r:id="rId14"/>
-    <p:sldId id="288" r:id="rId15"/>
-    <p:sldId id="287" r:id="rId16"/>
-    <p:sldId id="277" r:id="rId17"/>
+    <p:sldId id="289" r:id="rId15"/>
+    <p:sldId id="288" r:id="rId16"/>
+    <p:sldId id="287" r:id="rId17"/>
+    <p:sldId id="277" r:id="rId18"/>
   </p:sldIdLst>
   <p:sldSz cx="12192000" cy="6858000"/>
   <p:notesSz cx="6858000" cy="9144000"/>
@@ -209,7 +210,7 @@
           <a:p>
             <a:fld id="{C452ADB1-275D-430A-89EE-5C7E6CFF6FF2}" type="datetimeFigureOut">
               <a:rPr lang="en-US" smtClean="0"/>
-              <a:t>8/3/2023</a:t>
+              <a:t>8/4/2023</a:t>
             </a:fld>
             <a:endParaRPr lang="en-US" dirty="0"/>
           </a:p>
@@ -9269,7 +9270,7 @@
           <a:p>
             <a:fld id="{7005E26E-BCB2-4FD5-8FD5-81A5EAE94C21}" type="datetime1">
               <a:rPr lang="en-US" smtClean="0"/>
-              <a:t>8/3/2023</a:t>
+              <a:t>8/4/2023</a:t>
             </a:fld>
             <a:endParaRPr lang="en-US" dirty="0"/>
           </a:p>
@@ -9471,7 +9472,7 @@
           <a:p>
             <a:fld id="{9CC2E9B8-0487-42E4-B571-744A3D775783}" type="datetime1">
               <a:rPr lang="en-US" smtClean="0"/>
-              <a:t>8/3/2023</a:t>
+              <a:t>8/4/2023</a:t>
             </a:fld>
             <a:endParaRPr lang="en-US" dirty="0"/>
           </a:p>
@@ -9646,7 +9647,7 @@
           <a:p>
             <a:fld id="{9052E32D-1E84-43FD-8158-FFFE757EB0E8}" type="datetime1">
               <a:rPr lang="en-US" smtClean="0"/>
-              <a:t>8/3/2023</a:t>
+              <a:t>8/4/2023</a:t>
             </a:fld>
             <a:endParaRPr lang="en-US" dirty="0"/>
           </a:p>
@@ -9846,7 +9847,7 @@
           <a:p>
             <a:fld id="{8585C470-CD19-455C-B830-6D252EAD7FE5}" type="datetime1">
               <a:rPr lang="en-US" smtClean="0"/>
-              <a:t>8/3/2023</a:t>
+              <a:t>8/4/2023</a:t>
             </a:fld>
             <a:endParaRPr lang="en-US" dirty="0"/>
           </a:p>
@@ -18739,7 +18740,7 @@
           <a:p>
             <a:fld id="{7F85C43C-50D9-4F49-A136-0EFF292F93ED}" type="datetime1">
               <a:rPr lang="en-US" smtClean="0"/>
-              <a:t>8/3/2023</a:t>
+              <a:t>8/4/2023</a:t>
             </a:fld>
             <a:endParaRPr lang="en-US" dirty="0"/>
           </a:p>
@@ -19008,7 +19009,7 @@
           <a:p>
             <a:fld id="{7B53B1A3-0AEF-4064-A724-D27D660C8653}" type="datetime1">
               <a:rPr lang="en-US" smtClean="0"/>
-              <a:t>8/3/2023</a:t>
+              <a:t>8/4/2023</a:t>
             </a:fld>
             <a:endParaRPr lang="en-US" dirty="0"/>
           </a:p>
@@ -19401,7 +19402,7 @@
           <a:p>
             <a:fld id="{37D5D0F2-BF66-4A24-9384-A0129B196518}" type="datetime1">
               <a:rPr lang="en-US" smtClean="0"/>
-              <a:t>8/3/2023</a:t>
+              <a:t>8/4/2023</a:t>
             </a:fld>
             <a:endParaRPr lang="en-US" dirty="0"/>
           </a:p>
@@ -19514,7 +19515,7 @@
           <a:p>
             <a:fld id="{8C318A6C-4F6B-48D2-BDB0-D7413B3FDB0A}" type="datetime1">
               <a:rPr lang="en-US" smtClean="0"/>
-              <a:t>8/3/2023</a:t>
+              <a:t>8/4/2023</a:t>
             </a:fld>
             <a:endParaRPr lang="en-US" dirty="0"/>
           </a:p>
@@ -19604,7 +19605,7 @@
           <a:p>
             <a:fld id="{BF01ECED-6ECE-4989-B917-9D4D7E6D3C76}" type="datetime1">
               <a:rPr lang="en-US" smtClean="0"/>
-              <a:t>8/3/2023</a:t>
+              <a:t>8/4/2023</a:t>
             </a:fld>
             <a:endParaRPr lang="en-US" dirty="0"/>
           </a:p>
@@ -19889,7 +19890,7 @@
           <a:p>
             <a:fld id="{E3B570E1-CB40-488E-8C6F-EF4211DFFCB0}" type="datetime1">
               <a:rPr lang="en-US" smtClean="0"/>
-              <a:t>8/3/2023</a:t>
+              <a:t>8/4/2023</a:t>
             </a:fld>
             <a:endParaRPr lang="en-US" dirty="0"/>
           </a:p>
@@ -20164,7 +20165,7 @@
           <a:p>
             <a:fld id="{D1CEB6AF-9F5C-43BE-879E-CB9514111250}" type="datetime1">
               <a:rPr lang="en-US" smtClean="0"/>
-              <a:t>8/3/2023</a:t>
+              <a:t>8/4/2023</a:t>
             </a:fld>
             <a:endParaRPr lang="en-US" dirty="0"/>
           </a:p>
@@ -20409,7 +20410,7 @@
           <a:p>
             <a:fld id="{E7EE424C-FCA3-4EDD-B274-8E055D649B7D}" type="datetime1">
               <a:rPr lang="en-US" smtClean="0"/>
-              <a:t>8/3/2023</a:t>
+              <a:t>8/4/2023</a:t>
             </a:fld>
             <a:endParaRPr lang="en-US" dirty="0"/>
           </a:p>
@@ -21219,7 +21220,7 @@
 </file>
 
 <file path=ppt/slides/slide10.xml><?xml version="1.0" encoding="utf-8"?>
-<p:sld xmlns:a="http://schemas.openxmlformats.org/drawingml/2006/main" xmlns:r="http://schemas.openxmlformats.org/officeDocument/2006/relationships" xmlns:p="http://schemas.openxmlformats.org/presentationml/2006/main">
+<p:sld xmlns:a="http://schemas.openxmlformats.org/drawingml/2006/main" xmlns:r="http://schemas.openxmlformats.org/officeDocument/2006/relationships" xmlns:p="http://schemas.openxmlformats.org/presentationml/2006/main" show="0">
   <p:cSld>
     <p:spTree>
       <p:nvGrpSpPr>
@@ -21256,7 +21257,10 @@
           <a:bodyPr/>
           <a:lstStyle/>
           <a:p>
-            <a:endParaRPr lang="en-US"/>
+            <a:r>
+              <a:rPr lang="en-US" dirty="0"/>
+              <a:t>Multiple linear regression tests</a:t>
+            </a:r>
           </a:p>
         </p:txBody>
       </p:sp>
@@ -21284,8 +21288,8 @@
         </p:blipFill>
         <p:spPr>
           <a:xfrm>
-            <a:off x="7329150" y="1272631"/>
-            <a:ext cx="1782106" cy="1352713"/>
+            <a:off x="290359" y="2306278"/>
+            <a:ext cx="2868673" cy="2177475"/>
           </a:xfrm>
         </p:spPr>
       </p:pic>
@@ -21311,8 +21315,8 @@
         </p:blipFill>
         <p:spPr>
           <a:xfrm>
-            <a:off x="9531348" y="1272631"/>
-            <a:ext cx="1685050" cy="1295278"/>
+            <a:off x="308338" y="4483753"/>
+            <a:ext cx="2832716" cy="2177475"/>
           </a:xfrm>
           <a:prstGeom prst="rect">
             <a:avLst/>
@@ -21341,8 +21345,8 @@
         </p:blipFill>
         <p:spPr>
           <a:xfrm>
-            <a:off x="7329151" y="2672216"/>
-            <a:ext cx="1782105" cy="1379613"/>
+            <a:off x="3159032" y="2289253"/>
+            <a:ext cx="2897728" cy="2243270"/>
           </a:xfrm>
           <a:prstGeom prst="rect">
             <a:avLst/>
@@ -21371,8 +21375,8 @@
         </p:blipFill>
         <p:spPr>
           <a:xfrm>
-            <a:off x="9482822" y="2625344"/>
-            <a:ext cx="1782104" cy="1397477"/>
+            <a:off x="3174800" y="4475572"/>
+            <a:ext cx="2921200" cy="2290725"/>
           </a:xfrm>
           <a:prstGeom prst="rect">
             <a:avLst/>
@@ -21401,8 +21405,8 @@
         </p:blipFill>
         <p:spPr>
           <a:xfrm>
-            <a:off x="7329152" y="4094922"/>
-            <a:ext cx="1782105" cy="1356491"/>
+            <a:off x="6219431" y="2306278"/>
+            <a:ext cx="2860682" cy="2177475"/>
           </a:xfrm>
           <a:prstGeom prst="rect">
             <a:avLst/>
@@ -21431,8 +21435,8 @@
         </p:blipFill>
         <p:spPr>
           <a:xfrm>
-            <a:off x="9482821" y="4051229"/>
-            <a:ext cx="1782105" cy="1397479"/>
+            <a:off x="6313695" y="4523027"/>
+            <a:ext cx="2860682" cy="2243270"/>
           </a:xfrm>
           <a:prstGeom prst="rect">
             <a:avLst/>
@@ -21461,8 +21465,8 @@
         </p:blipFill>
         <p:spPr>
           <a:xfrm>
-            <a:off x="9482822" y="5451413"/>
-            <a:ext cx="1782104" cy="1397477"/>
+            <a:off x="9215426" y="4598483"/>
+            <a:ext cx="2668236" cy="2092358"/>
           </a:xfrm>
           <a:prstGeom prst="rect">
             <a:avLst/>
@@ -21491,14 +21495,380 @@
         </p:blipFill>
         <p:spPr>
           <a:xfrm>
-            <a:off x="7329152" y="5451414"/>
-            <a:ext cx="1782105" cy="1356491"/>
+            <a:off x="9174377" y="2355048"/>
+            <a:ext cx="2865407" cy="2181072"/>
           </a:xfrm>
           <a:prstGeom prst="rect">
             <a:avLst/>
           </a:prstGeom>
         </p:spPr>
       </p:pic>
+      <p:sp>
+        <p:nvSpPr>
+          <p:cNvPr id="3" name="Title 1">
+            <a:extLst>
+              <a:ext uri="{FF2B5EF4-FFF2-40B4-BE49-F238E27FC236}">
+                <a16:creationId xmlns:a16="http://schemas.microsoft.com/office/drawing/2014/main" id="{F6C290FB-75C7-D7F3-8888-A3817E879C88}"/>
+              </a:ext>
+            </a:extLst>
+          </p:cNvPr>
+          <p:cNvSpPr txBox="1">
+            <a:spLocks/>
+          </p:cNvSpPr>
+          <p:nvPr/>
+        </p:nvSpPr>
+        <p:spPr>
+          <a:xfrm>
+            <a:off x="865303" y="1790687"/>
+            <a:ext cx="1896031" cy="637060"/>
+          </a:xfrm>
+          <a:prstGeom prst="rect">
+            <a:avLst/>
+          </a:prstGeom>
+          <a:solidFill>
+            <a:schemeClr val="bg1"/>
+          </a:solidFill>
+        </p:spPr>
+        <p:txBody>
+          <a:bodyPr vert="horz" lIns="91440" tIns="45720" rIns="91440" bIns="45720" rtlCol="0" anchor="ctr">
+            <a:normAutofit/>
+          </a:bodyPr>
+          <a:lstStyle>
+            <a:lvl1pPr algn="l" defTabSz="914400" rtl="0" eaLnBrk="1" latinLnBrk="0" hangingPunct="1">
+              <a:lnSpc>
+                <a:spcPct val="80000"/>
+              </a:lnSpc>
+              <a:spcBef>
+                <a:spcPct val="0"/>
+              </a:spcBef>
+              <a:buNone/>
+              <a:defRPr sz="5000" kern="1200" cap="all" spc="100" baseline="0">
+                <a:solidFill>
+                  <a:schemeClr val="tx1">
+                    <a:lumMod val="95000"/>
+                    <a:lumOff val="5000"/>
+                  </a:schemeClr>
+                </a:solidFill>
+                <a:latin typeface="+mj-lt"/>
+                <a:ea typeface="+mj-ea"/>
+                <a:cs typeface="+mj-cs"/>
+              </a:defRPr>
+            </a:lvl1pPr>
+          </a:lstStyle>
+          <a:p>
+            <a:pPr algn="ctr"/>
+            <a:r>
+              <a:rPr lang="en-US" sz="2800" dirty="0" err="1"/>
+              <a:t>gdp</a:t>
+            </a:r>
+            <a:endParaRPr lang="en-US" sz="2800" dirty="0"/>
+          </a:p>
+        </p:txBody>
+      </p:sp>
+      <p:sp>
+        <p:nvSpPr>
+          <p:cNvPr id="4" name="Title 1">
+            <a:extLst>
+              <a:ext uri="{FF2B5EF4-FFF2-40B4-BE49-F238E27FC236}">
+                <a16:creationId xmlns:a16="http://schemas.microsoft.com/office/drawing/2014/main" id="{52EC28AC-AB2F-568C-F7BE-BF5CD738FB75}"/>
+              </a:ext>
+            </a:extLst>
+          </p:cNvPr>
+          <p:cNvSpPr txBox="1">
+            <a:spLocks/>
+          </p:cNvSpPr>
+          <p:nvPr/>
+        </p:nvSpPr>
+        <p:spPr>
+          <a:xfrm rot="16200000">
+            <a:off x="-393904" y="5413224"/>
+            <a:ext cx="1287628" cy="318531"/>
+          </a:xfrm>
+          <a:prstGeom prst="rect">
+            <a:avLst/>
+          </a:prstGeom>
+          <a:solidFill>
+            <a:schemeClr val="bg1"/>
+          </a:solidFill>
+        </p:spPr>
+        <p:txBody>
+          <a:bodyPr vert="horz" lIns="91440" tIns="45720" rIns="91440" bIns="45720" rtlCol="0" anchor="ctr">
+            <a:normAutofit fontScale="55000" lnSpcReduction="20000"/>
+          </a:bodyPr>
+          <a:lstStyle>
+            <a:lvl1pPr algn="l" defTabSz="914400" rtl="0" eaLnBrk="1" latinLnBrk="0" hangingPunct="1">
+              <a:lnSpc>
+                <a:spcPct val="80000"/>
+              </a:lnSpc>
+              <a:spcBef>
+                <a:spcPct val="0"/>
+              </a:spcBef>
+              <a:buNone/>
+              <a:defRPr sz="5000" kern="1200" cap="all" spc="100" baseline="0">
+                <a:solidFill>
+                  <a:schemeClr val="tx1">
+                    <a:lumMod val="95000"/>
+                    <a:lumOff val="5000"/>
+                  </a:schemeClr>
+                </a:solidFill>
+                <a:latin typeface="+mj-lt"/>
+                <a:ea typeface="+mj-ea"/>
+                <a:cs typeface="+mj-cs"/>
+              </a:defRPr>
+            </a:lvl1pPr>
+          </a:lstStyle>
+          <a:p>
+            <a:r>
+              <a:rPr lang="en-US" sz="2800" dirty="0"/>
+              <a:t>Vaccinated %</a:t>
+            </a:r>
+          </a:p>
+        </p:txBody>
+      </p:sp>
+      <p:sp>
+        <p:nvSpPr>
+          <p:cNvPr id="6" name="Title 1">
+            <a:extLst>
+              <a:ext uri="{FF2B5EF4-FFF2-40B4-BE49-F238E27FC236}">
+                <a16:creationId xmlns:a16="http://schemas.microsoft.com/office/drawing/2014/main" id="{7233EBD4-FC86-9C70-9944-2CBBE556F0D6}"/>
+              </a:ext>
+            </a:extLst>
+          </p:cNvPr>
+          <p:cNvSpPr txBox="1">
+            <a:spLocks/>
+          </p:cNvSpPr>
+          <p:nvPr/>
+        </p:nvSpPr>
+        <p:spPr>
+          <a:xfrm rot="16200000">
+            <a:off x="-335476" y="3061244"/>
+            <a:ext cx="1287628" cy="318531"/>
+          </a:xfrm>
+          <a:prstGeom prst="rect">
+            <a:avLst/>
+          </a:prstGeom>
+          <a:solidFill>
+            <a:schemeClr val="bg1"/>
+          </a:solidFill>
+        </p:spPr>
+        <p:txBody>
+          <a:bodyPr vert="horz" lIns="91440" tIns="45720" rIns="91440" bIns="45720" rtlCol="0" anchor="ctr">
+            <a:normAutofit fontScale="62500" lnSpcReduction="20000"/>
+          </a:bodyPr>
+          <a:lstStyle>
+            <a:lvl1pPr algn="l" defTabSz="914400" rtl="0" eaLnBrk="1" latinLnBrk="0" hangingPunct="1">
+              <a:lnSpc>
+                <a:spcPct val="80000"/>
+              </a:lnSpc>
+              <a:spcBef>
+                <a:spcPct val="0"/>
+              </a:spcBef>
+              <a:buNone/>
+              <a:defRPr sz="5000" kern="1200" cap="all" spc="100" baseline="0">
+                <a:solidFill>
+                  <a:schemeClr val="tx1">
+                    <a:lumMod val="95000"/>
+                    <a:lumOff val="5000"/>
+                  </a:schemeClr>
+                </a:solidFill>
+                <a:latin typeface="+mj-lt"/>
+                <a:ea typeface="+mj-ea"/>
+                <a:cs typeface="+mj-cs"/>
+              </a:defRPr>
+            </a:lvl1pPr>
+          </a:lstStyle>
+          <a:p>
+            <a:r>
+              <a:rPr lang="en-US" sz="2800" dirty="0"/>
+              <a:t>Total deaths</a:t>
+            </a:r>
+          </a:p>
+        </p:txBody>
+      </p:sp>
+      <p:sp>
+        <p:nvSpPr>
+          <p:cNvPr id="8" name="Title 1">
+            <a:extLst>
+              <a:ext uri="{FF2B5EF4-FFF2-40B4-BE49-F238E27FC236}">
+                <a16:creationId xmlns:a16="http://schemas.microsoft.com/office/drawing/2014/main" id="{6A39140C-AD50-1D6B-B5D7-68982700A991}"/>
+              </a:ext>
+            </a:extLst>
+          </p:cNvPr>
+          <p:cNvSpPr txBox="1">
+            <a:spLocks/>
+          </p:cNvSpPr>
+          <p:nvPr/>
+        </p:nvSpPr>
+        <p:spPr>
+          <a:xfrm>
+            <a:off x="3812326" y="1736820"/>
+            <a:ext cx="1896031" cy="637060"/>
+          </a:xfrm>
+          <a:prstGeom prst="rect">
+            <a:avLst/>
+          </a:prstGeom>
+          <a:solidFill>
+            <a:schemeClr val="bg1"/>
+          </a:solidFill>
+        </p:spPr>
+        <p:txBody>
+          <a:bodyPr vert="horz" lIns="91440" tIns="45720" rIns="91440" bIns="45720" rtlCol="0" anchor="ctr">
+            <a:normAutofit/>
+          </a:bodyPr>
+          <a:lstStyle>
+            <a:lvl1pPr algn="l" defTabSz="914400" rtl="0" eaLnBrk="1" latinLnBrk="0" hangingPunct="1">
+              <a:lnSpc>
+                <a:spcPct val="80000"/>
+              </a:lnSpc>
+              <a:spcBef>
+                <a:spcPct val="0"/>
+              </a:spcBef>
+              <a:buNone/>
+              <a:defRPr sz="5000" kern="1200" cap="all" spc="100" baseline="0">
+                <a:solidFill>
+                  <a:schemeClr val="tx1">
+                    <a:lumMod val="95000"/>
+                    <a:lumOff val="5000"/>
+                  </a:schemeClr>
+                </a:solidFill>
+                <a:latin typeface="+mj-lt"/>
+                <a:ea typeface="+mj-ea"/>
+                <a:cs typeface="+mj-cs"/>
+              </a:defRPr>
+            </a:lvl1pPr>
+          </a:lstStyle>
+          <a:p>
+            <a:pPr algn="ctr"/>
+            <a:r>
+              <a:rPr lang="en-US" sz="2800" dirty="0"/>
+              <a:t>Median age</a:t>
+            </a:r>
+          </a:p>
+        </p:txBody>
+      </p:sp>
+      <p:sp>
+        <p:nvSpPr>
+          <p:cNvPr id="10" name="Title 1">
+            <a:extLst>
+              <a:ext uri="{FF2B5EF4-FFF2-40B4-BE49-F238E27FC236}">
+                <a16:creationId xmlns:a16="http://schemas.microsoft.com/office/drawing/2014/main" id="{CA3BDA57-9BC0-9485-ECEF-FAAAA844BA42}"/>
+              </a:ext>
+            </a:extLst>
+          </p:cNvPr>
+          <p:cNvSpPr txBox="1">
+            <a:spLocks/>
+          </p:cNvSpPr>
+          <p:nvPr/>
+        </p:nvSpPr>
+        <p:spPr>
+          <a:xfrm>
+            <a:off x="6872725" y="1744363"/>
+            <a:ext cx="1896031" cy="637060"/>
+          </a:xfrm>
+          <a:prstGeom prst="rect">
+            <a:avLst/>
+          </a:prstGeom>
+          <a:solidFill>
+            <a:schemeClr val="bg1"/>
+          </a:solidFill>
+        </p:spPr>
+        <p:txBody>
+          <a:bodyPr vert="horz" lIns="91440" tIns="45720" rIns="91440" bIns="45720" rtlCol="0" anchor="ctr">
+            <a:normAutofit/>
+          </a:bodyPr>
+          <a:lstStyle>
+            <a:lvl1pPr algn="l" defTabSz="914400" rtl="0" eaLnBrk="1" latinLnBrk="0" hangingPunct="1">
+              <a:lnSpc>
+                <a:spcPct val="80000"/>
+              </a:lnSpc>
+              <a:spcBef>
+                <a:spcPct val="0"/>
+              </a:spcBef>
+              <a:buNone/>
+              <a:defRPr sz="5000" kern="1200" cap="all" spc="100" baseline="0">
+                <a:solidFill>
+                  <a:schemeClr val="tx1">
+                    <a:lumMod val="95000"/>
+                    <a:lumOff val="5000"/>
+                  </a:schemeClr>
+                </a:solidFill>
+                <a:latin typeface="+mj-lt"/>
+                <a:ea typeface="+mj-ea"/>
+                <a:cs typeface="+mj-cs"/>
+              </a:defRPr>
+            </a:lvl1pPr>
+          </a:lstStyle>
+          <a:p>
+            <a:pPr algn="ctr"/>
+            <a:r>
+              <a:rPr lang="en-US" sz="2800" dirty="0" err="1"/>
+              <a:t>hdi</a:t>
+            </a:r>
+            <a:endParaRPr lang="en-US" sz="2800" dirty="0"/>
+          </a:p>
+        </p:txBody>
+      </p:sp>
+      <p:sp>
+        <p:nvSpPr>
+          <p:cNvPr id="12" name="Title 1">
+            <a:extLst>
+              <a:ext uri="{FF2B5EF4-FFF2-40B4-BE49-F238E27FC236}">
+                <a16:creationId xmlns:a16="http://schemas.microsoft.com/office/drawing/2014/main" id="{7C6A326F-3D6F-4A91-6DF1-259F193FD46A}"/>
+              </a:ext>
+            </a:extLst>
+          </p:cNvPr>
+          <p:cNvSpPr txBox="1">
+            <a:spLocks/>
+          </p:cNvSpPr>
+          <p:nvPr/>
+        </p:nvSpPr>
+        <p:spPr>
+          <a:xfrm>
+            <a:off x="9796184" y="1744363"/>
+            <a:ext cx="1896031" cy="637060"/>
+          </a:xfrm>
+          <a:prstGeom prst="rect">
+            <a:avLst/>
+          </a:prstGeom>
+          <a:solidFill>
+            <a:schemeClr val="bg1"/>
+          </a:solidFill>
+        </p:spPr>
+        <p:txBody>
+          <a:bodyPr vert="horz" lIns="91440" tIns="45720" rIns="91440" bIns="45720" rtlCol="0" anchor="ctr">
+            <a:normAutofit fontScale="92500" lnSpcReduction="20000"/>
+          </a:bodyPr>
+          <a:lstStyle>
+            <a:lvl1pPr algn="l" defTabSz="914400" rtl="0" eaLnBrk="1" latinLnBrk="0" hangingPunct="1">
+              <a:lnSpc>
+                <a:spcPct val="80000"/>
+              </a:lnSpc>
+              <a:spcBef>
+                <a:spcPct val="0"/>
+              </a:spcBef>
+              <a:buNone/>
+              <a:defRPr sz="5000" kern="1200" cap="all" spc="100" baseline="0">
+                <a:solidFill>
+                  <a:schemeClr val="tx1">
+                    <a:lumMod val="95000"/>
+                    <a:lumOff val="5000"/>
+                  </a:schemeClr>
+                </a:solidFill>
+                <a:latin typeface="+mj-lt"/>
+                <a:ea typeface="+mj-ea"/>
+                <a:cs typeface="+mj-cs"/>
+              </a:defRPr>
+            </a:lvl1pPr>
+          </a:lstStyle>
+          <a:p>
+            <a:pPr algn="ctr"/>
+            <a:r>
+              <a:rPr lang="en-US" sz="2800" dirty="0"/>
+              <a:t>Life expectancy</a:t>
+            </a:r>
+          </a:p>
+        </p:txBody>
+      </p:sp>
     </p:spTree>
     <p:extLst>
       <p:ext uri="{BB962C8B-B14F-4D97-AF65-F5344CB8AC3E}">
@@ -21513,6 +21883,804 @@
 </file>
 
 <file path=ppt/slides/slide11.xml><?xml version="1.0" encoding="utf-8"?>
+<p:sld xmlns:a="http://schemas.openxmlformats.org/drawingml/2006/main" xmlns:r="http://schemas.openxmlformats.org/officeDocument/2006/relationships" xmlns:p="http://schemas.openxmlformats.org/presentationml/2006/main">
+  <p:cSld>
+    <p:spTree>
+      <p:nvGrpSpPr>
+        <p:cNvPr id="1" name=""/>
+        <p:cNvGrpSpPr/>
+        <p:nvPr/>
+      </p:nvGrpSpPr>
+      <p:grpSpPr>
+        <a:xfrm>
+          <a:off x="0" y="0"/>
+          <a:ext cx="0" cy="0"/>
+          <a:chOff x="0" y="0"/>
+          <a:chExt cx="0" cy="0"/>
+        </a:xfrm>
+      </p:grpSpPr>
+      <p:sp>
+        <p:nvSpPr>
+          <p:cNvPr id="2" name="Title 1">
+            <a:extLst>
+              <a:ext uri="{FF2B5EF4-FFF2-40B4-BE49-F238E27FC236}">
+                <a16:creationId xmlns:a16="http://schemas.microsoft.com/office/drawing/2014/main" id="{A504B3CD-0F8D-3FC7-A2E2-D3C8656B8583}"/>
+              </a:ext>
+            </a:extLst>
+          </p:cNvPr>
+          <p:cNvSpPr>
+            <a:spLocks noGrp="1"/>
+          </p:cNvSpPr>
+          <p:nvPr>
+            <p:ph type="title"/>
+          </p:nvPr>
+        </p:nvSpPr>
+        <p:spPr>
+          <a:xfrm>
+            <a:off x="781327" y="-224520"/>
+            <a:ext cx="9720072" cy="1499616"/>
+          </a:xfrm>
+        </p:spPr>
+        <p:txBody>
+          <a:bodyPr/>
+          <a:lstStyle/>
+          <a:p>
+            <a:r>
+              <a:rPr lang="en-US" dirty="0"/>
+              <a:t>Multiple linear regression tests</a:t>
+            </a:r>
+          </a:p>
+        </p:txBody>
+      </p:sp>
+      <p:pic>
+        <p:nvPicPr>
+          <p:cNvPr id="5" name="Content Placeholder 4" descr="A graph with blue dots and a blue line&#10;&#10;Description automatically generated">
+            <a:extLst>
+              <a:ext uri="{FF2B5EF4-FFF2-40B4-BE49-F238E27FC236}">
+                <a16:creationId xmlns:a16="http://schemas.microsoft.com/office/drawing/2014/main" id="{0AAC1293-606E-D89A-CE69-485169480EF6}"/>
+              </a:ext>
+            </a:extLst>
+          </p:cNvPr>
+          <p:cNvPicPr>
+            <a:picLocks noGrp="1" noChangeAspect="1"/>
+          </p:cNvPicPr>
+          <p:nvPr>
+            <p:ph idx="1"/>
+          </p:nvPr>
+        </p:nvPicPr>
+        <p:blipFill>
+          <a:blip r:embed="rId2"/>
+          <a:stretch>
+            <a:fillRect/>
+          </a:stretch>
+        </p:blipFill>
+        <p:spPr>
+          <a:xfrm>
+            <a:off x="996908" y="1213893"/>
+            <a:ext cx="3677728" cy="2791591"/>
+          </a:xfrm>
+        </p:spPr>
+      </p:pic>
+      <p:pic>
+        <p:nvPicPr>
+          <p:cNvPr id="7" name="Picture 6" descr="A graph with blue dots and a blue line&#10;&#10;Description automatically generated">
+            <a:extLst>
+              <a:ext uri="{FF2B5EF4-FFF2-40B4-BE49-F238E27FC236}">
+                <a16:creationId xmlns:a16="http://schemas.microsoft.com/office/drawing/2014/main" id="{C693A6DB-F6DB-D35B-9271-1C0517652675}"/>
+              </a:ext>
+            </a:extLst>
+          </p:cNvPr>
+          <p:cNvPicPr>
+            <a:picLocks noChangeAspect="1"/>
+          </p:cNvPicPr>
+          <p:nvPr/>
+        </p:nvPicPr>
+        <p:blipFill>
+          <a:blip r:embed="rId3"/>
+          <a:stretch>
+            <a:fillRect/>
+          </a:stretch>
+        </p:blipFill>
+        <p:spPr>
+          <a:xfrm>
+            <a:off x="1032864" y="3899165"/>
+            <a:ext cx="3641771" cy="2799386"/>
+          </a:xfrm>
+          <a:prstGeom prst="rect">
+            <a:avLst/>
+          </a:prstGeom>
+        </p:spPr>
+      </p:pic>
+      <p:pic>
+        <p:nvPicPr>
+          <p:cNvPr id="13" name="Picture 12" descr="A graph with blue dots and a line&#10;&#10;Description automatically generated">
+            <a:extLst>
+              <a:ext uri="{FF2B5EF4-FFF2-40B4-BE49-F238E27FC236}">
+                <a16:creationId xmlns:a16="http://schemas.microsoft.com/office/drawing/2014/main" id="{0CD1A02B-AC21-FA55-5D13-47E9E1D751D4}"/>
+              </a:ext>
+            </a:extLst>
+          </p:cNvPr>
+          <p:cNvPicPr>
+            <a:picLocks noChangeAspect="1"/>
+          </p:cNvPicPr>
+          <p:nvPr/>
+        </p:nvPicPr>
+        <p:blipFill>
+          <a:blip r:embed="rId4"/>
+          <a:stretch>
+            <a:fillRect/>
+          </a:stretch>
+        </p:blipFill>
+        <p:spPr>
+          <a:xfrm>
+            <a:off x="4698112" y="1248634"/>
+            <a:ext cx="3677728" cy="2799389"/>
+          </a:xfrm>
+          <a:prstGeom prst="rect">
+            <a:avLst/>
+          </a:prstGeom>
+        </p:spPr>
+      </p:pic>
+      <p:pic>
+        <p:nvPicPr>
+          <p:cNvPr id="15" name="Picture 14" descr="A graph with blue dots and a line&#10;&#10;Description automatically generated">
+            <a:extLst>
+              <a:ext uri="{FF2B5EF4-FFF2-40B4-BE49-F238E27FC236}">
+                <a16:creationId xmlns:a16="http://schemas.microsoft.com/office/drawing/2014/main" id="{7E3394F9-0EA6-E78F-A79A-2B93AA9D752E}"/>
+              </a:ext>
+            </a:extLst>
+          </p:cNvPr>
+          <p:cNvPicPr>
+            <a:picLocks noChangeAspect="1"/>
+          </p:cNvPicPr>
+          <p:nvPr/>
+        </p:nvPicPr>
+        <p:blipFill>
+          <a:blip r:embed="rId5"/>
+          <a:stretch>
+            <a:fillRect/>
+          </a:stretch>
+        </p:blipFill>
+        <p:spPr>
+          <a:xfrm>
+            <a:off x="4745131" y="3899165"/>
+            <a:ext cx="3630408" cy="2846868"/>
+          </a:xfrm>
+          <a:prstGeom prst="rect">
+            <a:avLst/>
+          </a:prstGeom>
+        </p:spPr>
+      </p:pic>
+      <p:sp>
+        <p:nvSpPr>
+          <p:cNvPr id="3" name="Title 1">
+            <a:extLst>
+              <a:ext uri="{FF2B5EF4-FFF2-40B4-BE49-F238E27FC236}">
+                <a16:creationId xmlns:a16="http://schemas.microsoft.com/office/drawing/2014/main" id="{F6C290FB-75C7-D7F3-8888-A3817E879C88}"/>
+              </a:ext>
+            </a:extLst>
+          </p:cNvPr>
+          <p:cNvSpPr txBox="1">
+            <a:spLocks/>
+          </p:cNvSpPr>
+          <p:nvPr/>
+        </p:nvSpPr>
+        <p:spPr>
+          <a:xfrm>
+            <a:off x="1763485" y="858417"/>
+            <a:ext cx="2360645" cy="491325"/>
+          </a:xfrm>
+          <a:prstGeom prst="rect">
+            <a:avLst/>
+          </a:prstGeom>
+          <a:solidFill>
+            <a:schemeClr val="bg1"/>
+          </a:solidFill>
+        </p:spPr>
+        <p:txBody>
+          <a:bodyPr vert="horz" lIns="91440" tIns="45720" rIns="91440" bIns="45720" rtlCol="0" anchor="ctr">
+            <a:normAutofit/>
+          </a:bodyPr>
+          <a:lstStyle>
+            <a:lvl1pPr algn="l" defTabSz="914400" rtl="0" eaLnBrk="1" latinLnBrk="0" hangingPunct="1">
+              <a:lnSpc>
+                <a:spcPct val="80000"/>
+              </a:lnSpc>
+              <a:spcBef>
+                <a:spcPct val="0"/>
+              </a:spcBef>
+              <a:buNone/>
+              <a:defRPr sz="5000" kern="1200" cap="all" spc="100" baseline="0">
+                <a:solidFill>
+                  <a:schemeClr val="tx1">
+                    <a:lumMod val="95000"/>
+                    <a:lumOff val="5000"/>
+                  </a:schemeClr>
+                </a:solidFill>
+                <a:latin typeface="+mj-lt"/>
+                <a:ea typeface="+mj-ea"/>
+                <a:cs typeface="+mj-cs"/>
+              </a:defRPr>
+            </a:lvl1pPr>
+          </a:lstStyle>
+          <a:p>
+            <a:pPr algn="ctr"/>
+            <a:r>
+              <a:rPr lang="en-US" sz="2800" dirty="0" err="1"/>
+              <a:t>gdp</a:t>
+            </a:r>
+            <a:endParaRPr lang="en-US" sz="2800" dirty="0"/>
+          </a:p>
+        </p:txBody>
+      </p:sp>
+      <p:sp>
+        <p:nvSpPr>
+          <p:cNvPr id="4" name="Title 1">
+            <a:extLst>
+              <a:ext uri="{FF2B5EF4-FFF2-40B4-BE49-F238E27FC236}">
+                <a16:creationId xmlns:a16="http://schemas.microsoft.com/office/drawing/2014/main" id="{52EC28AC-AB2F-568C-F7BE-BF5CD738FB75}"/>
+              </a:ext>
+            </a:extLst>
+          </p:cNvPr>
+          <p:cNvSpPr txBox="1">
+            <a:spLocks/>
+          </p:cNvSpPr>
+          <p:nvPr/>
+        </p:nvSpPr>
+        <p:spPr>
+          <a:xfrm rot="16200000">
+            <a:off x="-148707" y="4685568"/>
+            <a:ext cx="1980206" cy="690683"/>
+          </a:xfrm>
+          <a:prstGeom prst="rect">
+            <a:avLst/>
+          </a:prstGeom>
+          <a:solidFill>
+            <a:schemeClr val="bg1"/>
+          </a:solidFill>
+        </p:spPr>
+        <p:txBody>
+          <a:bodyPr vert="horz" lIns="91440" tIns="45720" rIns="91440" bIns="45720" rtlCol="0" anchor="ctr">
+            <a:normAutofit/>
+          </a:bodyPr>
+          <a:lstStyle>
+            <a:lvl1pPr algn="l" defTabSz="914400" rtl="0" eaLnBrk="1" latinLnBrk="0" hangingPunct="1">
+              <a:lnSpc>
+                <a:spcPct val="80000"/>
+              </a:lnSpc>
+              <a:spcBef>
+                <a:spcPct val="0"/>
+              </a:spcBef>
+              <a:buNone/>
+              <a:defRPr sz="5000" kern="1200" cap="all" spc="100" baseline="0">
+                <a:solidFill>
+                  <a:schemeClr val="tx1">
+                    <a:lumMod val="95000"/>
+                    <a:lumOff val="5000"/>
+                  </a:schemeClr>
+                </a:solidFill>
+                <a:latin typeface="+mj-lt"/>
+                <a:ea typeface="+mj-ea"/>
+                <a:cs typeface="+mj-cs"/>
+              </a:defRPr>
+            </a:lvl1pPr>
+          </a:lstStyle>
+          <a:p>
+            <a:r>
+              <a:rPr lang="en-US" sz="2800" dirty="0"/>
+              <a:t>Vaccinated %</a:t>
+            </a:r>
+          </a:p>
+        </p:txBody>
+      </p:sp>
+      <p:sp>
+        <p:nvSpPr>
+          <p:cNvPr id="6" name="Title 1">
+            <a:extLst>
+              <a:ext uri="{FF2B5EF4-FFF2-40B4-BE49-F238E27FC236}">
+                <a16:creationId xmlns:a16="http://schemas.microsoft.com/office/drawing/2014/main" id="{7233EBD4-FC86-9C70-9944-2CBBE556F0D6}"/>
+              </a:ext>
+            </a:extLst>
+          </p:cNvPr>
+          <p:cNvSpPr txBox="1">
+            <a:spLocks/>
+          </p:cNvSpPr>
+          <p:nvPr/>
+        </p:nvSpPr>
+        <p:spPr>
+          <a:xfrm rot="16200000">
+            <a:off x="-146171" y="2223235"/>
+            <a:ext cx="1870790" cy="685237"/>
+          </a:xfrm>
+          <a:prstGeom prst="rect">
+            <a:avLst/>
+          </a:prstGeom>
+          <a:solidFill>
+            <a:schemeClr val="bg1"/>
+          </a:solidFill>
+        </p:spPr>
+        <p:txBody>
+          <a:bodyPr vert="horz" lIns="91440" tIns="45720" rIns="91440" bIns="45720" rtlCol="0" anchor="ctr">
+            <a:normAutofit/>
+          </a:bodyPr>
+          <a:lstStyle>
+            <a:lvl1pPr algn="l" defTabSz="914400" rtl="0" eaLnBrk="1" latinLnBrk="0" hangingPunct="1">
+              <a:lnSpc>
+                <a:spcPct val="80000"/>
+              </a:lnSpc>
+              <a:spcBef>
+                <a:spcPct val="0"/>
+              </a:spcBef>
+              <a:buNone/>
+              <a:defRPr sz="5000" kern="1200" cap="all" spc="100" baseline="0">
+                <a:solidFill>
+                  <a:schemeClr val="tx1">
+                    <a:lumMod val="95000"/>
+                    <a:lumOff val="5000"/>
+                  </a:schemeClr>
+                </a:solidFill>
+                <a:latin typeface="+mj-lt"/>
+                <a:ea typeface="+mj-ea"/>
+                <a:cs typeface="+mj-cs"/>
+              </a:defRPr>
+            </a:lvl1pPr>
+          </a:lstStyle>
+          <a:p>
+            <a:r>
+              <a:rPr lang="en-US" sz="2800" dirty="0"/>
+              <a:t>Total deaths</a:t>
+            </a:r>
+          </a:p>
+        </p:txBody>
+      </p:sp>
+      <p:sp>
+        <p:nvSpPr>
+          <p:cNvPr id="10" name="Title 1">
+            <a:extLst>
+              <a:ext uri="{FF2B5EF4-FFF2-40B4-BE49-F238E27FC236}">
+                <a16:creationId xmlns:a16="http://schemas.microsoft.com/office/drawing/2014/main" id="{CA3BDA57-9BC0-9485-ECEF-FAAAA844BA42}"/>
+              </a:ext>
+            </a:extLst>
+          </p:cNvPr>
+          <p:cNvSpPr txBox="1">
+            <a:spLocks/>
+          </p:cNvSpPr>
+          <p:nvPr/>
+        </p:nvSpPr>
+        <p:spPr>
+          <a:xfrm>
+            <a:off x="5334554" y="794880"/>
+            <a:ext cx="2792393" cy="595077"/>
+          </a:xfrm>
+          <a:prstGeom prst="rect">
+            <a:avLst/>
+          </a:prstGeom>
+          <a:solidFill>
+            <a:schemeClr val="bg1"/>
+          </a:solidFill>
+        </p:spPr>
+        <p:txBody>
+          <a:bodyPr vert="horz" lIns="91440" tIns="45720" rIns="91440" bIns="45720" rtlCol="0" anchor="ctr">
+            <a:normAutofit/>
+          </a:bodyPr>
+          <a:lstStyle>
+            <a:lvl1pPr algn="l" defTabSz="914400" rtl="0" eaLnBrk="1" latinLnBrk="0" hangingPunct="1">
+              <a:lnSpc>
+                <a:spcPct val="80000"/>
+              </a:lnSpc>
+              <a:spcBef>
+                <a:spcPct val="0"/>
+              </a:spcBef>
+              <a:buNone/>
+              <a:defRPr sz="5000" kern="1200" cap="all" spc="100" baseline="0">
+                <a:solidFill>
+                  <a:schemeClr val="tx1">
+                    <a:lumMod val="95000"/>
+                    <a:lumOff val="5000"/>
+                  </a:schemeClr>
+                </a:solidFill>
+                <a:latin typeface="+mj-lt"/>
+                <a:ea typeface="+mj-ea"/>
+                <a:cs typeface="+mj-cs"/>
+              </a:defRPr>
+            </a:lvl1pPr>
+          </a:lstStyle>
+          <a:p>
+            <a:pPr algn="ctr"/>
+            <a:r>
+              <a:rPr lang="en-US" sz="2800" dirty="0" err="1"/>
+              <a:t>hdi</a:t>
+            </a:r>
+            <a:endParaRPr lang="en-US" sz="2800" dirty="0"/>
+          </a:p>
+        </p:txBody>
+      </p:sp>
+      <p:sp>
+        <p:nvSpPr>
+          <p:cNvPr id="14" name="Content Placeholder 2">
+            <a:extLst>
+              <a:ext uri="{FF2B5EF4-FFF2-40B4-BE49-F238E27FC236}">
+                <a16:creationId xmlns:a16="http://schemas.microsoft.com/office/drawing/2014/main" id="{7F40F44B-D6DD-EFEC-EB8F-AD66F7913779}"/>
+              </a:ext>
+            </a:extLst>
+          </p:cNvPr>
+          <p:cNvSpPr txBox="1">
+            <a:spLocks/>
+          </p:cNvSpPr>
+          <p:nvPr/>
+        </p:nvSpPr>
+        <p:spPr>
+          <a:xfrm>
+            <a:off x="9045939" y="1726164"/>
+            <a:ext cx="2792393" cy="4023360"/>
+          </a:xfrm>
+          <a:prstGeom prst="rect">
+            <a:avLst/>
+          </a:prstGeom>
+        </p:spPr>
+        <p:txBody>
+          <a:bodyPr vert="horz" lIns="45720" tIns="45720" rIns="45720" bIns="45720" rtlCol="0">
+            <a:normAutofit/>
+          </a:bodyPr>
+          <a:lstStyle>
+            <a:lvl1pPr marL="91440" indent="-91440" algn="l" defTabSz="914400" rtl="0" eaLnBrk="1" latinLnBrk="0" hangingPunct="1">
+              <a:lnSpc>
+                <a:spcPct val="90000"/>
+              </a:lnSpc>
+              <a:spcBef>
+                <a:spcPts val="1200"/>
+              </a:spcBef>
+              <a:spcAft>
+                <a:spcPts val="200"/>
+              </a:spcAft>
+              <a:buClr>
+                <a:schemeClr val="accent1"/>
+              </a:buClr>
+              <a:buSzPct val="100000"/>
+              <a:buFont typeface="Tw Cen MT" panose="020B0602020104020603" pitchFamily="34" charset="0"/>
+              <a:buChar char=" "/>
+              <a:defRPr sz="2200" kern="1200">
+                <a:solidFill>
+                  <a:schemeClr val="tx1"/>
+                </a:solidFill>
+                <a:latin typeface="+mn-lt"/>
+                <a:ea typeface="+mn-ea"/>
+                <a:cs typeface="+mn-cs"/>
+              </a:defRPr>
+            </a:lvl1pPr>
+            <a:lvl2pPr marL="265176" indent="-137160" algn="l" defTabSz="914400" rtl="0" eaLnBrk="1" latinLnBrk="0" hangingPunct="1">
+              <a:lnSpc>
+                <a:spcPct val="90000"/>
+              </a:lnSpc>
+              <a:spcBef>
+                <a:spcPts val="200"/>
+              </a:spcBef>
+              <a:spcAft>
+                <a:spcPts val="400"/>
+              </a:spcAft>
+              <a:buClr>
+                <a:schemeClr val="accent1"/>
+              </a:buClr>
+              <a:buFont typeface="Wingdings 3" pitchFamily="18" charset="2"/>
+              <a:buChar char=""/>
+              <a:defRPr sz="1800" kern="1200">
+                <a:solidFill>
+                  <a:schemeClr val="tx1"/>
+                </a:solidFill>
+                <a:latin typeface="+mn-lt"/>
+                <a:ea typeface="+mn-ea"/>
+                <a:cs typeface="+mn-cs"/>
+              </a:defRPr>
+            </a:lvl2pPr>
+            <a:lvl3pPr marL="448056" indent="-137160" algn="l" defTabSz="914400" rtl="0" eaLnBrk="1" latinLnBrk="0" hangingPunct="1">
+              <a:lnSpc>
+                <a:spcPct val="90000"/>
+              </a:lnSpc>
+              <a:spcBef>
+                <a:spcPts val="200"/>
+              </a:spcBef>
+              <a:spcAft>
+                <a:spcPts val="400"/>
+              </a:spcAft>
+              <a:buClr>
+                <a:schemeClr val="accent1"/>
+              </a:buClr>
+              <a:buFont typeface="Wingdings 3" pitchFamily="18" charset="2"/>
+              <a:buChar char=""/>
+              <a:defRPr sz="1400" kern="1200">
+                <a:solidFill>
+                  <a:schemeClr val="tx1"/>
+                </a:solidFill>
+                <a:latin typeface="+mn-lt"/>
+                <a:ea typeface="+mn-ea"/>
+                <a:cs typeface="+mn-cs"/>
+              </a:defRPr>
+            </a:lvl3pPr>
+            <a:lvl4pPr marL="594360" indent="-137160" algn="l" defTabSz="914400" rtl="0" eaLnBrk="1" latinLnBrk="0" hangingPunct="1">
+              <a:lnSpc>
+                <a:spcPct val="90000"/>
+              </a:lnSpc>
+              <a:spcBef>
+                <a:spcPts val="200"/>
+              </a:spcBef>
+              <a:spcAft>
+                <a:spcPts val="400"/>
+              </a:spcAft>
+              <a:buClr>
+                <a:schemeClr val="accent1"/>
+              </a:buClr>
+              <a:buFont typeface="Wingdings 3" pitchFamily="18" charset="2"/>
+              <a:buChar char=""/>
+              <a:defRPr sz="1400" kern="1200">
+                <a:solidFill>
+                  <a:schemeClr val="tx1"/>
+                </a:solidFill>
+                <a:latin typeface="+mn-lt"/>
+                <a:ea typeface="+mn-ea"/>
+                <a:cs typeface="+mn-cs"/>
+              </a:defRPr>
+            </a:lvl4pPr>
+            <a:lvl5pPr marL="777240" indent="-137160" algn="l" defTabSz="914400" rtl="0" eaLnBrk="1" latinLnBrk="0" hangingPunct="1">
+              <a:lnSpc>
+                <a:spcPct val="90000"/>
+              </a:lnSpc>
+              <a:spcBef>
+                <a:spcPts val="200"/>
+              </a:spcBef>
+              <a:spcAft>
+                <a:spcPts val="400"/>
+              </a:spcAft>
+              <a:buClr>
+                <a:schemeClr val="accent1"/>
+              </a:buClr>
+              <a:buFont typeface="Wingdings 3" pitchFamily="18" charset="2"/>
+              <a:buChar char=""/>
+              <a:defRPr sz="1400" kern="1200">
+                <a:solidFill>
+                  <a:schemeClr val="tx1"/>
+                </a:solidFill>
+                <a:latin typeface="+mn-lt"/>
+                <a:ea typeface="+mn-ea"/>
+                <a:cs typeface="+mn-cs"/>
+              </a:defRPr>
+            </a:lvl5pPr>
+            <a:lvl6pPr marL="914400" indent="-137160" algn="l" defTabSz="914400" rtl="0" eaLnBrk="1" latinLnBrk="0" hangingPunct="1">
+              <a:lnSpc>
+                <a:spcPct val="90000"/>
+              </a:lnSpc>
+              <a:spcBef>
+                <a:spcPts val="200"/>
+              </a:spcBef>
+              <a:spcAft>
+                <a:spcPts val="400"/>
+              </a:spcAft>
+              <a:buClr>
+                <a:schemeClr val="accent1"/>
+              </a:buClr>
+              <a:buFont typeface="Wingdings 3" pitchFamily="18" charset="2"/>
+              <a:buChar char=""/>
+              <a:defRPr sz="1400" kern="1200">
+                <a:solidFill>
+                  <a:schemeClr val="tx1"/>
+                </a:solidFill>
+                <a:latin typeface="+mn-lt"/>
+                <a:ea typeface="+mn-ea"/>
+                <a:cs typeface="+mn-cs"/>
+              </a:defRPr>
+            </a:lvl6pPr>
+            <a:lvl7pPr marL="1060704" indent="-137160" algn="l" defTabSz="914400" rtl="0" eaLnBrk="1" latinLnBrk="0" hangingPunct="1">
+              <a:lnSpc>
+                <a:spcPct val="90000"/>
+              </a:lnSpc>
+              <a:spcBef>
+                <a:spcPts val="200"/>
+              </a:spcBef>
+              <a:spcAft>
+                <a:spcPts val="400"/>
+              </a:spcAft>
+              <a:buClr>
+                <a:schemeClr val="accent1"/>
+              </a:buClr>
+              <a:buFont typeface="Wingdings 3" pitchFamily="18" charset="2"/>
+              <a:buChar char=""/>
+              <a:defRPr sz="1400" kern="1200">
+                <a:solidFill>
+                  <a:schemeClr val="tx1"/>
+                </a:solidFill>
+                <a:latin typeface="+mn-lt"/>
+                <a:ea typeface="+mn-ea"/>
+                <a:cs typeface="+mn-cs"/>
+              </a:defRPr>
+            </a:lvl7pPr>
+            <a:lvl8pPr marL="1216152" indent="-137160" algn="l" defTabSz="914400" rtl="0" eaLnBrk="1" latinLnBrk="0" hangingPunct="1">
+              <a:lnSpc>
+                <a:spcPct val="90000"/>
+              </a:lnSpc>
+              <a:spcBef>
+                <a:spcPts val="200"/>
+              </a:spcBef>
+              <a:spcAft>
+                <a:spcPts val="400"/>
+              </a:spcAft>
+              <a:buClr>
+                <a:schemeClr val="accent1"/>
+              </a:buClr>
+              <a:buFont typeface="Wingdings 3" pitchFamily="18" charset="2"/>
+              <a:buChar char=""/>
+              <a:defRPr sz="1400" kern="1200">
+                <a:solidFill>
+                  <a:schemeClr val="tx1"/>
+                </a:solidFill>
+                <a:latin typeface="+mn-lt"/>
+                <a:ea typeface="+mn-ea"/>
+                <a:cs typeface="+mn-cs"/>
+              </a:defRPr>
+            </a:lvl8pPr>
+            <a:lvl9pPr marL="1362456" indent="-137160" algn="l" defTabSz="914400" rtl="0" eaLnBrk="1" latinLnBrk="0" hangingPunct="1">
+              <a:lnSpc>
+                <a:spcPct val="90000"/>
+              </a:lnSpc>
+              <a:spcBef>
+                <a:spcPts val="200"/>
+              </a:spcBef>
+              <a:spcAft>
+                <a:spcPts val="400"/>
+              </a:spcAft>
+              <a:buClr>
+                <a:schemeClr val="accent1"/>
+              </a:buClr>
+              <a:buFont typeface="Wingdings 3" pitchFamily="18" charset="2"/>
+              <a:buChar char=""/>
+              <a:defRPr sz="1400" kern="1200">
+                <a:solidFill>
+                  <a:schemeClr val="tx1"/>
+                </a:solidFill>
+                <a:latin typeface="+mn-lt"/>
+                <a:ea typeface="+mn-ea"/>
+                <a:cs typeface="+mn-cs"/>
+              </a:defRPr>
+            </a:lvl9pPr>
+          </a:lstStyle>
+          <a:p>
+            <a:endParaRPr lang="en-US" dirty="0"/>
+          </a:p>
+        </p:txBody>
+      </p:sp>
+      <p:pic>
+        <p:nvPicPr>
+          <p:cNvPr id="18" name="Picture 17" descr="A graph with blue dots and a line&#10;&#10;Description automatically generated">
+            <a:extLst>
+              <a:ext uri="{FF2B5EF4-FFF2-40B4-BE49-F238E27FC236}">
+                <a16:creationId xmlns:a16="http://schemas.microsoft.com/office/drawing/2014/main" id="{D5947668-4DDF-7049-5A77-36270523D278}"/>
+              </a:ext>
+            </a:extLst>
+          </p:cNvPr>
+          <p:cNvPicPr>
+            <a:picLocks noChangeAspect="1"/>
+          </p:cNvPicPr>
+          <p:nvPr/>
+        </p:nvPicPr>
+        <p:blipFill>
+          <a:blip r:embed="rId6"/>
+          <a:stretch>
+            <a:fillRect/>
+          </a:stretch>
+        </p:blipFill>
+        <p:spPr>
+          <a:xfrm>
+            <a:off x="8387383" y="1251148"/>
+            <a:ext cx="3533788" cy="2735674"/>
+          </a:xfrm>
+          <a:prstGeom prst="rect">
+            <a:avLst/>
+          </a:prstGeom>
+        </p:spPr>
+      </p:pic>
+      <p:sp>
+        <p:nvSpPr>
+          <p:cNvPr id="20" name="Title 1">
+            <a:extLst>
+              <a:ext uri="{FF2B5EF4-FFF2-40B4-BE49-F238E27FC236}">
+                <a16:creationId xmlns:a16="http://schemas.microsoft.com/office/drawing/2014/main" id="{3CAAFA93-DA2E-251C-2CE6-817A7E34964F}"/>
+              </a:ext>
+            </a:extLst>
+          </p:cNvPr>
+          <p:cNvSpPr txBox="1">
+            <a:spLocks/>
+          </p:cNvSpPr>
+          <p:nvPr/>
+        </p:nvSpPr>
+        <p:spPr>
+          <a:xfrm>
+            <a:off x="9012282" y="791989"/>
+            <a:ext cx="2792393" cy="595077"/>
+          </a:xfrm>
+          <a:prstGeom prst="rect">
+            <a:avLst/>
+          </a:prstGeom>
+          <a:solidFill>
+            <a:schemeClr val="bg1"/>
+          </a:solidFill>
+        </p:spPr>
+        <p:txBody>
+          <a:bodyPr vert="horz" lIns="91440" tIns="45720" rIns="91440" bIns="45720" rtlCol="0" anchor="ctr">
+            <a:normAutofit/>
+          </a:bodyPr>
+          <a:lstStyle>
+            <a:lvl1pPr algn="l" defTabSz="914400" rtl="0" eaLnBrk="1" latinLnBrk="0" hangingPunct="1">
+              <a:lnSpc>
+                <a:spcPct val="80000"/>
+              </a:lnSpc>
+              <a:spcBef>
+                <a:spcPct val="0"/>
+              </a:spcBef>
+              <a:buNone/>
+              <a:defRPr sz="5000" kern="1200" cap="all" spc="100" baseline="0">
+                <a:solidFill>
+                  <a:schemeClr val="tx1">
+                    <a:lumMod val="95000"/>
+                    <a:lumOff val="5000"/>
+                  </a:schemeClr>
+                </a:solidFill>
+                <a:latin typeface="+mj-lt"/>
+                <a:ea typeface="+mj-ea"/>
+                <a:cs typeface="+mj-cs"/>
+              </a:defRPr>
+            </a:lvl1pPr>
+          </a:lstStyle>
+          <a:p>
+            <a:pPr algn="ctr"/>
+            <a:r>
+              <a:rPr lang="en-US" sz="2800" dirty="0"/>
+              <a:t>Aged ≥ 65</a:t>
+            </a:r>
+          </a:p>
+        </p:txBody>
+      </p:sp>
+      <p:pic>
+        <p:nvPicPr>
+          <p:cNvPr id="22" name="Picture 21" descr="A graph of blue dots and a line&#10;&#10;Description automatically generated">
+            <a:extLst>
+              <a:ext uri="{FF2B5EF4-FFF2-40B4-BE49-F238E27FC236}">
+                <a16:creationId xmlns:a16="http://schemas.microsoft.com/office/drawing/2014/main" id="{0AC69E21-319C-E9F3-F49F-7C7ABB66F9A3}"/>
+              </a:ext>
+            </a:extLst>
+          </p:cNvPr>
+          <p:cNvPicPr>
+            <a:picLocks noChangeAspect="1"/>
+          </p:cNvPicPr>
+          <p:nvPr/>
+        </p:nvPicPr>
+        <p:blipFill>
+          <a:blip r:embed="rId7"/>
+          <a:stretch>
+            <a:fillRect/>
+          </a:stretch>
+        </p:blipFill>
+        <p:spPr>
+          <a:xfrm>
+            <a:off x="8416708" y="3899165"/>
+            <a:ext cx="3630409" cy="2846868"/>
+          </a:xfrm>
+          <a:prstGeom prst="rect">
+            <a:avLst/>
+          </a:prstGeom>
+        </p:spPr>
+      </p:pic>
+    </p:spTree>
+    <p:extLst>
+      <p:ext uri="{BB962C8B-B14F-4D97-AF65-F5344CB8AC3E}">
+        <p14:creationId xmlns:p14="http://schemas.microsoft.com/office/powerpoint/2010/main" val="1753931563"/>
+      </p:ext>
+    </p:extLst>
+  </p:cSld>
+  <p:clrMapOvr>
+    <a:masterClrMapping/>
+  </p:clrMapOvr>
+</p:sld>
+</file>
+
+<file path=ppt/slides/slide12.xml><?xml version="1.0" encoding="utf-8"?>
 <p:sld xmlns:a="http://schemas.openxmlformats.org/drawingml/2006/main" xmlns:r="http://schemas.openxmlformats.org/officeDocument/2006/relationships" xmlns:p="http://schemas.openxmlformats.org/presentationml/2006/main">
   <p:cSld>
     <p:spTree>
@@ -21580,19 +22748,19 @@
           <a:p>
             <a:r>
               <a:rPr lang="en-US" dirty="0"/>
-              <a:t>Covid vaccinations statistically support a decrease in total deaths, but this is debatable given the array of data which correlates slightly upwards with vaccination rates.</a:t>
+              <a:t>Efficacy of vaccinations statistically correlate with a decrease in total deaths, but this is not the only factor affecting death rates.</a:t>
             </a:r>
           </a:p>
           <a:p>
             <a:r>
               <a:rPr lang="en-US" dirty="0"/>
-              <a:t>Covid vaccination rates correlate with wealthier and older populations which died at higher rates than poorer and younger populations.</a:t>
+              <a:t>Covid vaccination rates correlate with wealthier, more developed, and older populations which died at higher rates than poorer and younger populations.</a:t>
             </a:r>
           </a:p>
           <a:p>
             <a:r>
               <a:rPr lang="en-US" dirty="0"/>
-              <a:t>A country’s covid death rates likely have more to do with the vulnerabilities of elderly populations.</a:t>
+              <a:t>A country’s death rates from covid likely have more to do with the vulnerabilities of elderly populations.</a:t>
             </a:r>
           </a:p>
         </p:txBody>
@@ -21610,7 +22778,7 @@
 </p:sld>
 </file>
 
-<file path=ppt/slides/slide12.xml><?xml version="1.0" encoding="utf-8"?>
+<file path=ppt/slides/slide13.xml><?xml version="1.0" encoding="utf-8"?>
 <p:sld xmlns:a="http://schemas.openxmlformats.org/drawingml/2006/main" xmlns:r="http://schemas.openxmlformats.org/officeDocument/2006/relationships" xmlns:p="http://schemas.openxmlformats.org/presentationml/2006/main">
   <p:cSld>
     <p:spTree>
@@ -21678,15 +22846,22 @@
           <a:p>
             <a:pPr lvl="1"/>
             <a:r>
-              <a:rPr lang="en-US" dirty="0"/>
+              <a:rPr lang="en-US" sz="2400" dirty="0"/>
               <a:t>Assess pandemic intensity over time as opposed to total</a:t>
             </a:r>
           </a:p>
           <a:p>
             <a:pPr lvl="1"/>
             <a:r>
-              <a:rPr lang="en-US" dirty="0"/>
+              <a:rPr lang="en-US" sz="2400" dirty="0"/>
               <a:t>Missing from this data is information about deaths by age group which could assist more refined assessments of vulnerable populations </a:t>
+            </a:r>
+          </a:p>
+          <a:p>
+            <a:pPr lvl="1"/>
+            <a:r>
+              <a:rPr lang="en-US" sz="2400" dirty="0"/>
+              <a:t>Measuring by excess mortality improve accuracy and account for underreporting in poorer or autocratic countries</a:t>
             </a:r>
           </a:p>
           <a:p>
@@ -21708,7 +22883,7 @@
 </p:sld>
 </file>
 
-<file path=ppt/slides/slide13.xml><?xml version="1.0" encoding="utf-8"?>
+<file path=ppt/slides/slide14.xml><?xml version="1.0" encoding="utf-8"?>
 <p:sld xmlns:a="http://schemas.openxmlformats.org/drawingml/2006/main" xmlns:r="http://schemas.openxmlformats.org/officeDocument/2006/relationships" xmlns:p="http://schemas.openxmlformats.org/presentationml/2006/main">
   <p:cSld>
     <p:bg>
@@ -21863,7 +23038,7 @@
 </file>
 
 <file path=ppt/slides/slide2.xml><?xml version="1.0" encoding="utf-8"?>
-<p:sld xmlns:a="http://schemas.openxmlformats.org/drawingml/2006/main" xmlns:r="http://schemas.openxmlformats.org/officeDocument/2006/relationships" xmlns:p="http://schemas.openxmlformats.org/presentationml/2006/main">
+<p:sld xmlns:a="http://schemas.openxmlformats.org/drawingml/2006/main" xmlns:r="http://schemas.openxmlformats.org/officeDocument/2006/relationships" xmlns:p="http://schemas.openxmlformats.org/presentationml/2006/main" show="0">
   <p:cSld>
     <p:spTree>
       <p:nvGrpSpPr>
@@ -22051,7 +23226,12 @@
             <p:ph idx="1"/>
           </p:nvPr>
         </p:nvSpPr>
-        <p:spPr/>
+        <p:spPr>
+          <a:xfrm>
+            <a:off x="734879" y="2084832"/>
+            <a:ext cx="9720073" cy="1499616"/>
+          </a:xfrm>
+        </p:spPr>
         <p:txBody>
           <a:bodyPr/>
           <a:lstStyle/>
@@ -22066,7 +23246,7 @@
             <a:pPr lvl="1"/>
             <a:r>
               <a:rPr lang="en-US" sz="2400" dirty="0"/>
-              <a:t>Target most vulnerable populations</a:t>
+              <a:t>Refine response to support vulnerable populations</a:t>
             </a:r>
           </a:p>
           <a:p>
@@ -22168,7 +23348,7 @@
           <a:p>
             <a:r>
               <a:rPr lang="en-US" dirty="0"/>
-              <a:t>35 Columns, 302K Rows</a:t>
+              <a:t>35 Columns, 302,000 Rows</a:t>
             </a:r>
           </a:p>
           <a:p>
@@ -22803,7 +23983,7 @@
           <a:p>
             <a:r>
               <a:rPr lang="en-US" dirty="0"/>
-              <a:t>Hypothesis test: Did vaccination rates decrease death rates?</a:t>
+              <a:t>Correlation analysis: Did vaccination rates decrease death rates?</a:t>
             </a:r>
           </a:p>
         </p:txBody>
@@ -22826,15 +24006,24 @@
         </p:nvSpPr>
         <p:spPr>
           <a:xfrm>
-            <a:off x="646639" y="2084832"/>
-            <a:ext cx="5237525" cy="920612"/>
+            <a:off x="646637" y="2271445"/>
+            <a:ext cx="5237525" cy="1408348"/>
           </a:xfrm>
         </p:spPr>
         <p:txBody>
           <a:bodyPr>
-            <a:normAutofit lnSpcReduction="10000"/>
+            <a:normAutofit/>
           </a:bodyPr>
           <a:lstStyle/>
+          <a:p>
+            <a:pPr marL="0" indent="0">
+              <a:buNone/>
+            </a:pPr>
+            <a:r>
+              <a:rPr lang="en-US" sz="1600" b="1" dirty="0"/>
+              <a:t>Hypothesis Test:</a:t>
+            </a:r>
+          </a:p>
           <a:p>
             <a:pPr marL="0" indent="0">
               <a:buNone/>
@@ -22913,7 +24102,7 @@
         <p:spPr>
           <a:xfrm>
             <a:off x="646638" y="3800885"/>
-            <a:ext cx="5237525" cy="1408349"/>
+            <a:ext cx="5237525" cy="1872127"/>
           </a:xfrm>
           <a:prstGeom prst="rect">
             <a:avLst/>
@@ -23151,6 +24340,13 @@
               <a:rPr lang="en-US" sz="1600" b="1" dirty="0"/>
               <a:t>P-value: 0.012</a:t>
             </a:r>
+            <a:br>
+              <a:rPr lang="en-US" sz="1600" b="1" dirty="0"/>
+            </a:br>
+            <a:r>
+              <a:rPr lang="en-US" sz="1600" b="1" dirty="0"/>
+              <a:t>R-squared: 0.057</a:t>
+            </a:r>
           </a:p>
           <a:p>
             <a:pPr marL="0" indent="0">
@@ -23167,7 +24363,10 @@
               <a:buFont typeface="Tw Cen MT" panose="020B0602020104020603" pitchFamily="34" charset="0"/>
               <a:buNone/>
             </a:pPr>
-            <a:endParaRPr lang="en-US" sz="1600" dirty="0"/>
+            <a:r>
+              <a:rPr lang="en-US" sz="1600" dirty="0"/>
+              <a:t>…But this is counter-intuitive to the data, and the low r-squared value suggests that other variables may affect deaths per million more than vaccination rates.</a:t>
+            </a:r>
           </a:p>
         </p:txBody>
       </p:sp>
@@ -24117,6 +25316,15 @@
 </file>
 
 <file path=customXml/item1.xml><?xml version="1.0" encoding="utf-8"?>
+<?mso-contentType ?>
+<FormTemplates xmlns="http://schemas.microsoft.com/sharepoint/v3/contenttype/forms">
+  <Display>DocumentLibraryForm</Display>
+  <Edit>DocumentLibraryForm</Edit>
+  <New>DocumentLibraryForm</New>
+</FormTemplates>
+</file>
+
+<file path=customXml/item2.xml><?xml version="1.0" encoding="utf-8"?>
 <ct:contentTypeSchema xmlns:ct="http://schemas.microsoft.com/office/2006/metadata/contentType" xmlns:ma="http://schemas.microsoft.com/office/2006/metadata/properties/metaAttributes" ct:_="" ma:_="" ma:contentTypeName="Document" ma:contentTypeID="0x01010079F111ED35F8CC479449609E8A0923A6" ma:contentTypeVersion="11" ma:contentTypeDescription="Create a new document." ma:contentTypeScope="" ma:versionID="9677210f24a1be23c92c90fd886aa0aa">
   <xsd:schema xmlns:xsd="http://www.w3.org/2001/XMLSchema" xmlns:xs="http://www.w3.org/2001/XMLSchema" xmlns:p="http://schemas.microsoft.com/office/2006/metadata/properties" xmlns:ns2="71af3243-3dd4-4a8d-8c0d-dd76da1f02a5" xmlns:ns3="16c05727-aa75-4e4a-9b5f-8a80a1165891" targetNamespace="http://schemas.microsoft.com/office/2006/metadata/properties" ma:root="true" ma:fieldsID="60e05723c5c1908df1a1a4ebf11d344e" ns2:_="" ns3:_="">
     <xsd:import namespace="71af3243-3dd4-4a8d-8c0d-dd76da1f02a5"/>
@@ -24327,15 +25535,6 @@
 </ct:contentTypeSchema>
 </file>
 
-<file path=customXml/item2.xml><?xml version="1.0" encoding="utf-8"?>
-<?mso-contentType ?>
-<FormTemplates xmlns="http://schemas.microsoft.com/sharepoint/v3/contenttype/forms">
-  <Display>DocumentLibraryForm</Display>
-  <Edit>DocumentLibraryForm</Edit>
-  <New>DocumentLibraryForm</New>
-</FormTemplates>
-</file>
-
 <file path=customXml/item3.xml><?xml version="1.0" encoding="utf-8"?>
 <p:properties xmlns:p="http://schemas.microsoft.com/office/2006/metadata/properties" xmlns:xsi="http://www.w3.org/2001/XMLSchema-instance" xmlns:pc="http://schemas.microsoft.com/office/infopath/2007/PartnerControls">
   <documentManagement>
@@ -24345,6 +25544,14 @@
 </file>
 
 <file path=customXml/itemProps1.xml><?xml version="1.0" encoding="utf-8"?>
+<ds:datastoreItem xmlns:ds="http://schemas.openxmlformats.org/officeDocument/2006/customXml" ds:itemID="{4F44C90D-2A62-4985-9618-3460247437B1}">
+  <ds:schemaRefs>
+    <ds:schemaRef ds:uri="http://schemas.microsoft.com/sharepoint/v3/contenttype/forms"/>
+  </ds:schemaRefs>
+</ds:datastoreItem>
+</file>
+
+<file path=customXml/itemProps2.xml><?xml version="1.0" encoding="utf-8"?>
 <ds:datastoreItem xmlns:ds="http://schemas.openxmlformats.org/officeDocument/2006/customXml" ds:itemID="{B61EAB5F-88FC-4FAE-AE3C-037A3C365EB8}">
   <ds:schemaRefs>
     <ds:schemaRef ds:uri="http://schemas.microsoft.com/office/2006/metadata/contentType"/>
@@ -24363,14 +25570,6 @@
 </ds:datastoreItem>
 </file>
 
-<file path=customXml/itemProps2.xml><?xml version="1.0" encoding="utf-8"?>
-<ds:datastoreItem xmlns:ds="http://schemas.openxmlformats.org/officeDocument/2006/customXml" ds:itemID="{4F44C90D-2A62-4985-9618-3460247437B1}">
-  <ds:schemaRefs>
-    <ds:schemaRef ds:uri="http://schemas.microsoft.com/sharepoint/v3/contenttype/forms"/>
-  </ds:schemaRefs>
-</ds:datastoreItem>
-</file>
-
 <file path=customXml/itemProps3.xml><?xml version="1.0" encoding="utf-8"?>
 <ds:datastoreItem xmlns:ds="http://schemas.openxmlformats.org/officeDocument/2006/customXml" ds:itemID="{788A2F88-55C5-4ED1-9541-807C65424763}">
   <ds:schemaRefs>

</xml_diff>

<commit_message>
Developing .py file and cleaned up ppt.
</commit_message>
<xml_diff>
--- a/ppt/Covid Death Rates.pptx
+++ b/ppt/Covid Death Rates.pptx
@@ -210,7 +210,7 @@
           <a:p>
             <a:fld id="{C452ADB1-275D-430A-89EE-5C7E6CFF6FF2}" type="datetimeFigureOut">
               <a:rPr lang="en-US" smtClean="0"/>
-              <a:t>8/4/2023</a:t>
+              <a:t>8/8/2023</a:t>
             </a:fld>
             <a:endParaRPr lang="en-US" dirty="0"/>
           </a:p>
@@ -9270,7 +9270,7 @@
           <a:p>
             <a:fld id="{7005E26E-BCB2-4FD5-8FD5-81A5EAE94C21}" type="datetime1">
               <a:rPr lang="en-US" smtClean="0"/>
-              <a:t>8/4/2023</a:t>
+              <a:t>8/8/2023</a:t>
             </a:fld>
             <a:endParaRPr lang="en-US" dirty="0"/>
           </a:p>
@@ -9472,7 +9472,7 @@
           <a:p>
             <a:fld id="{9CC2E9B8-0487-42E4-B571-744A3D775783}" type="datetime1">
               <a:rPr lang="en-US" smtClean="0"/>
-              <a:t>8/4/2023</a:t>
+              <a:t>8/8/2023</a:t>
             </a:fld>
             <a:endParaRPr lang="en-US" dirty="0"/>
           </a:p>
@@ -9647,7 +9647,7 @@
           <a:p>
             <a:fld id="{9052E32D-1E84-43FD-8158-FFFE757EB0E8}" type="datetime1">
               <a:rPr lang="en-US" smtClean="0"/>
-              <a:t>8/4/2023</a:t>
+              <a:t>8/8/2023</a:t>
             </a:fld>
             <a:endParaRPr lang="en-US" dirty="0"/>
           </a:p>
@@ -9847,7 +9847,7 @@
           <a:p>
             <a:fld id="{8585C470-CD19-455C-B830-6D252EAD7FE5}" type="datetime1">
               <a:rPr lang="en-US" smtClean="0"/>
-              <a:t>8/4/2023</a:t>
+              <a:t>8/8/2023</a:t>
             </a:fld>
             <a:endParaRPr lang="en-US" dirty="0"/>
           </a:p>
@@ -18740,7 +18740,7 @@
           <a:p>
             <a:fld id="{7F85C43C-50D9-4F49-A136-0EFF292F93ED}" type="datetime1">
               <a:rPr lang="en-US" smtClean="0"/>
-              <a:t>8/4/2023</a:t>
+              <a:t>8/8/2023</a:t>
             </a:fld>
             <a:endParaRPr lang="en-US" dirty="0"/>
           </a:p>
@@ -19009,7 +19009,7 @@
           <a:p>
             <a:fld id="{7B53B1A3-0AEF-4064-A724-D27D660C8653}" type="datetime1">
               <a:rPr lang="en-US" smtClean="0"/>
-              <a:t>8/4/2023</a:t>
+              <a:t>8/8/2023</a:t>
             </a:fld>
             <a:endParaRPr lang="en-US" dirty="0"/>
           </a:p>
@@ -19402,7 +19402,7 @@
           <a:p>
             <a:fld id="{37D5D0F2-BF66-4A24-9384-A0129B196518}" type="datetime1">
               <a:rPr lang="en-US" smtClean="0"/>
-              <a:t>8/4/2023</a:t>
+              <a:t>8/8/2023</a:t>
             </a:fld>
             <a:endParaRPr lang="en-US" dirty="0"/>
           </a:p>
@@ -19515,7 +19515,7 @@
           <a:p>
             <a:fld id="{8C318A6C-4F6B-48D2-BDB0-D7413B3FDB0A}" type="datetime1">
               <a:rPr lang="en-US" smtClean="0"/>
-              <a:t>8/4/2023</a:t>
+              <a:t>8/8/2023</a:t>
             </a:fld>
             <a:endParaRPr lang="en-US" dirty="0"/>
           </a:p>
@@ -19605,7 +19605,7 @@
           <a:p>
             <a:fld id="{BF01ECED-6ECE-4989-B917-9D4D7E6D3C76}" type="datetime1">
               <a:rPr lang="en-US" smtClean="0"/>
-              <a:t>8/4/2023</a:t>
+              <a:t>8/8/2023</a:t>
             </a:fld>
             <a:endParaRPr lang="en-US" dirty="0"/>
           </a:p>
@@ -19890,7 +19890,7 @@
           <a:p>
             <a:fld id="{E3B570E1-CB40-488E-8C6F-EF4211DFFCB0}" type="datetime1">
               <a:rPr lang="en-US" smtClean="0"/>
-              <a:t>8/4/2023</a:t>
+              <a:t>8/8/2023</a:t>
             </a:fld>
             <a:endParaRPr lang="en-US" dirty="0"/>
           </a:p>
@@ -20165,7 +20165,7 @@
           <a:p>
             <a:fld id="{D1CEB6AF-9F5C-43BE-879E-CB9514111250}" type="datetime1">
               <a:rPr lang="en-US" smtClean="0"/>
-              <a:t>8/4/2023</a:t>
+              <a:t>8/8/2023</a:t>
             </a:fld>
             <a:endParaRPr lang="en-US" dirty="0"/>
           </a:p>
@@ -20410,7 +20410,7 @@
           <a:p>
             <a:fld id="{E7EE424C-FCA3-4EDD-B274-8E055D649B7D}" type="datetime1">
               <a:rPr lang="en-US" smtClean="0"/>
-              <a:t>8/4/2023</a:t>
+              <a:t>8/8/2023</a:t>
             </a:fld>
             <a:endParaRPr lang="en-US" dirty="0"/>
           </a:p>
@@ -24338,15 +24338,20 @@
             </a:pPr>
             <a:r>
               <a:rPr lang="en-US" sz="1600" b="1" dirty="0"/>
-              <a:t>P-value: 0.012</a:t>
+              <a:t>P-value: 0.002</a:t>
             </a:r>
             <a:br>
               <a:rPr lang="en-US" sz="1600" b="1" dirty="0"/>
             </a:br>
             <a:r>
               <a:rPr lang="en-US" sz="1600" b="1" dirty="0"/>
-              <a:t>R-squared: 0.057</a:t>
+              <a:t>R-squared</a:t>
             </a:r>
+            <a:r>
+              <a:rPr lang="en-US" sz="1600" b="1"/>
+              <a:t>: 0.079</a:t>
+            </a:r>
+            <a:endParaRPr lang="en-US" sz="1600" b="1" dirty="0"/>
           </a:p>
           <a:p>
             <a:pPr marL="0" indent="0">
@@ -25316,15 +25321,6 @@
 </file>
 
 <file path=customXml/item1.xml><?xml version="1.0" encoding="utf-8"?>
-<?mso-contentType ?>
-<FormTemplates xmlns="http://schemas.microsoft.com/sharepoint/v3/contenttype/forms">
-  <Display>DocumentLibraryForm</Display>
-  <Edit>DocumentLibraryForm</Edit>
-  <New>DocumentLibraryForm</New>
-</FormTemplates>
-</file>
-
-<file path=customXml/item2.xml><?xml version="1.0" encoding="utf-8"?>
 <ct:contentTypeSchema xmlns:ct="http://schemas.microsoft.com/office/2006/metadata/contentType" xmlns:ma="http://schemas.microsoft.com/office/2006/metadata/properties/metaAttributes" ct:_="" ma:_="" ma:contentTypeName="Document" ma:contentTypeID="0x01010079F111ED35F8CC479449609E8A0923A6" ma:contentTypeVersion="11" ma:contentTypeDescription="Create a new document." ma:contentTypeScope="" ma:versionID="9677210f24a1be23c92c90fd886aa0aa">
   <xsd:schema xmlns:xsd="http://www.w3.org/2001/XMLSchema" xmlns:xs="http://www.w3.org/2001/XMLSchema" xmlns:p="http://schemas.microsoft.com/office/2006/metadata/properties" xmlns:ns2="71af3243-3dd4-4a8d-8c0d-dd76da1f02a5" xmlns:ns3="16c05727-aa75-4e4a-9b5f-8a80a1165891" targetNamespace="http://schemas.microsoft.com/office/2006/metadata/properties" ma:root="true" ma:fieldsID="60e05723c5c1908df1a1a4ebf11d344e" ns2:_="" ns3:_="">
     <xsd:import namespace="71af3243-3dd4-4a8d-8c0d-dd76da1f02a5"/>
@@ -25535,6 +25531,15 @@
 </ct:contentTypeSchema>
 </file>
 
+<file path=customXml/item2.xml><?xml version="1.0" encoding="utf-8"?>
+<?mso-contentType ?>
+<FormTemplates xmlns="http://schemas.microsoft.com/sharepoint/v3/contenttype/forms">
+  <Display>DocumentLibraryForm</Display>
+  <Edit>DocumentLibraryForm</Edit>
+  <New>DocumentLibraryForm</New>
+</FormTemplates>
+</file>
+
 <file path=customXml/item3.xml><?xml version="1.0" encoding="utf-8"?>
 <p:properties xmlns:p="http://schemas.microsoft.com/office/2006/metadata/properties" xmlns:xsi="http://www.w3.org/2001/XMLSchema-instance" xmlns:pc="http://schemas.microsoft.com/office/infopath/2007/PartnerControls">
   <documentManagement>
@@ -25544,14 +25549,6 @@
 </file>
 
 <file path=customXml/itemProps1.xml><?xml version="1.0" encoding="utf-8"?>
-<ds:datastoreItem xmlns:ds="http://schemas.openxmlformats.org/officeDocument/2006/customXml" ds:itemID="{4F44C90D-2A62-4985-9618-3460247437B1}">
-  <ds:schemaRefs>
-    <ds:schemaRef ds:uri="http://schemas.microsoft.com/sharepoint/v3/contenttype/forms"/>
-  </ds:schemaRefs>
-</ds:datastoreItem>
-</file>
-
-<file path=customXml/itemProps2.xml><?xml version="1.0" encoding="utf-8"?>
 <ds:datastoreItem xmlns:ds="http://schemas.openxmlformats.org/officeDocument/2006/customXml" ds:itemID="{B61EAB5F-88FC-4FAE-AE3C-037A3C365EB8}">
   <ds:schemaRefs>
     <ds:schemaRef ds:uri="http://schemas.microsoft.com/office/2006/metadata/contentType"/>
@@ -25570,6 +25567,14 @@
 </ds:datastoreItem>
 </file>
 
+<file path=customXml/itemProps2.xml><?xml version="1.0" encoding="utf-8"?>
+<ds:datastoreItem xmlns:ds="http://schemas.openxmlformats.org/officeDocument/2006/customXml" ds:itemID="{4F44C90D-2A62-4985-9618-3460247437B1}">
+  <ds:schemaRefs>
+    <ds:schemaRef ds:uri="http://schemas.microsoft.com/sharepoint/v3/contenttype/forms"/>
+  </ds:schemaRefs>
+</ds:datastoreItem>
+</file>
+
 <file path=customXml/itemProps3.xml><?xml version="1.0" encoding="utf-8"?>
 <ds:datastoreItem xmlns:ds="http://schemas.openxmlformats.org/officeDocument/2006/customXml" ds:itemID="{788A2F88-55C5-4ED1-9541-807C65424763}">
   <ds:schemaRefs>

</xml_diff>

<commit_message>
Added refined plots to images, input code to .py file.  Worked on Readme.
</commit_message>
<xml_diff>
--- a/ppt/Covid Death Rates.pptx
+++ b/ppt/Covid Death Rates.pptx
@@ -210,7 +210,7 @@
           <a:p>
             <a:fld id="{C452ADB1-275D-430A-89EE-5C7E6CFF6FF2}" type="datetimeFigureOut">
               <a:rPr lang="en-US" smtClean="0"/>
-              <a:t>8/8/2023</a:t>
+              <a:t>8/9/2023</a:t>
             </a:fld>
             <a:endParaRPr lang="en-US" dirty="0"/>
           </a:p>
@@ -9270,7 +9270,7 @@
           <a:p>
             <a:fld id="{7005E26E-BCB2-4FD5-8FD5-81A5EAE94C21}" type="datetime1">
               <a:rPr lang="en-US" smtClean="0"/>
-              <a:t>8/8/2023</a:t>
+              <a:t>8/9/2023</a:t>
             </a:fld>
             <a:endParaRPr lang="en-US" dirty="0"/>
           </a:p>
@@ -9472,7 +9472,7 @@
           <a:p>
             <a:fld id="{9CC2E9B8-0487-42E4-B571-744A3D775783}" type="datetime1">
               <a:rPr lang="en-US" smtClean="0"/>
-              <a:t>8/8/2023</a:t>
+              <a:t>8/9/2023</a:t>
             </a:fld>
             <a:endParaRPr lang="en-US" dirty="0"/>
           </a:p>
@@ -9647,7 +9647,7 @@
           <a:p>
             <a:fld id="{9052E32D-1E84-43FD-8158-FFFE757EB0E8}" type="datetime1">
               <a:rPr lang="en-US" smtClean="0"/>
-              <a:t>8/8/2023</a:t>
+              <a:t>8/9/2023</a:t>
             </a:fld>
             <a:endParaRPr lang="en-US" dirty="0"/>
           </a:p>
@@ -9847,7 +9847,7 @@
           <a:p>
             <a:fld id="{8585C470-CD19-455C-B830-6D252EAD7FE5}" type="datetime1">
               <a:rPr lang="en-US" smtClean="0"/>
-              <a:t>8/8/2023</a:t>
+              <a:t>8/9/2023</a:t>
             </a:fld>
             <a:endParaRPr lang="en-US" dirty="0"/>
           </a:p>
@@ -18740,7 +18740,7 @@
           <a:p>
             <a:fld id="{7F85C43C-50D9-4F49-A136-0EFF292F93ED}" type="datetime1">
               <a:rPr lang="en-US" smtClean="0"/>
-              <a:t>8/8/2023</a:t>
+              <a:t>8/9/2023</a:t>
             </a:fld>
             <a:endParaRPr lang="en-US" dirty="0"/>
           </a:p>
@@ -19009,7 +19009,7 @@
           <a:p>
             <a:fld id="{7B53B1A3-0AEF-4064-A724-D27D660C8653}" type="datetime1">
               <a:rPr lang="en-US" smtClean="0"/>
-              <a:t>8/8/2023</a:t>
+              <a:t>8/9/2023</a:t>
             </a:fld>
             <a:endParaRPr lang="en-US" dirty="0"/>
           </a:p>
@@ -19402,7 +19402,7 @@
           <a:p>
             <a:fld id="{37D5D0F2-BF66-4A24-9384-A0129B196518}" type="datetime1">
               <a:rPr lang="en-US" smtClean="0"/>
-              <a:t>8/8/2023</a:t>
+              <a:t>8/9/2023</a:t>
             </a:fld>
             <a:endParaRPr lang="en-US" dirty="0"/>
           </a:p>
@@ -19515,7 +19515,7 @@
           <a:p>
             <a:fld id="{8C318A6C-4F6B-48D2-BDB0-D7413B3FDB0A}" type="datetime1">
               <a:rPr lang="en-US" smtClean="0"/>
-              <a:t>8/8/2023</a:t>
+              <a:t>8/9/2023</a:t>
             </a:fld>
             <a:endParaRPr lang="en-US" dirty="0"/>
           </a:p>
@@ -19605,7 +19605,7 @@
           <a:p>
             <a:fld id="{BF01ECED-6ECE-4989-B917-9D4D7E6D3C76}" type="datetime1">
               <a:rPr lang="en-US" smtClean="0"/>
-              <a:t>8/8/2023</a:t>
+              <a:t>8/9/2023</a:t>
             </a:fld>
             <a:endParaRPr lang="en-US" dirty="0"/>
           </a:p>
@@ -19890,7 +19890,7 @@
           <a:p>
             <a:fld id="{E3B570E1-CB40-488E-8C6F-EF4211DFFCB0}" type="datetime1">
               <a:rPr lang="en-US" smtClean="0"/>
-              <a:t>8/8/2023</a:t>
+              <a:t>8/9/2023</a:t>
             </a:fld>
             <a:endParaRPr lang="en-US" dirty="0"/>
           </a:p>
@@ -20165,7 +20165,7 @@
           <a:p>
             <a:fld id="{D1CEB6AF-9F5C-43BE-879E-CB9514111250}" type="datetime1">
               <a:rPr lang="en-US" smtClean="0"/>
-              <a:t>8/8/2023</a:t>
+              <a:t>8/9/2023</a:t>
             </a:fld>
             <a:endParaRPr lang="en-US" dirty="0"/>
           </a:p>
@@ -20410,7 +20410,7 @@
           <a:p>
             <a:fld id="{E7EE424C-FCA3-4EDD-B274-8E055D649B7D}" type="datetime1">
               <a:rPr lang="en-US" smtClean="0"/>
-              <a:t>8/8/2023</a:t>
+              <a:t>8/9/2023</a:t>
             </a:fld>
             <a:endParaRPr lang="en-US" dirty="0"/>
           </a:p>
@@ -22741,25 +22741,44 @@
             <p:ph idx="1"/>
           </p:nvPr>
         </p:nvSpPr>
-        <p:spPr/>
+        <p:spPr>
+          <a:ln>
+            <a:solidFill>
+              <a:schemeClr val="bg1"/>
+            </a:solidFill>
+          </a:ln>
+        </p:spPr>
         <p:txBody>
-          <a:bodyPr/>
+          <a:bodyPr>
+            <a:normAutofit/>
+          </a:bodyPr>
           <a:lstStyle/>
           <a:p>
+            <a:pPr lvl="1"/>
             <a:r>
-              <a:rPr lang="en-US" dirty="0"/>
+              <a:rPr lang="en-US" sz="2400" dirty="0"/>
               <a:t>Efficacy of vaccinations statistically correlate with a decrease in total deaths, but this is not the only factor affecting death rates.</a:t>
             </a:r>
           </a:p>
           <a:p>
+            <a:pPr lvl="1"/>
+            <a:endParaRPr lang="en-US" sz="2400" dirty="0"/>
+          </a:p>
+          <a:p>
+            <a:pPr lvl="1"/>
             <a:r>
-              <a:rPr lang="en-US" dirty="0"/>
+              <a:rPr lang="en-US" sz="2400" dirty="0"/>
               <a:t>Covid vaccination rates correlate with wealthier, more developed, and older populations which died at higher rates than poorer and younger populations.</a:t>
             </a:r>
           </a:p>
           <a:p>
+            <a:pPr lvl="1"/>
+            <a:endParaRPr lang="en-US" sz="2400" dirty="0"/>
+          </a:p>
+          <a:p>
+            <a:pPr lvl="1"/>
             <a:r>
-              <a:rPr lang="en-US" dirty="0"/>
+              <a:rPr lang="en-US" sz="2400" dirty="0"/>
               <a:t>A country’s death rates from covid likely have more to do with the vulnerabilities of elderly populations.</a:t>
             </a:r>
           </a:p>
@@ -22852,10 +22871,18 @@
           </a:p>
           <a:p>
             <a:pPr lvl="1"/>
+            <a:endParaRPr lang="en-US" sz="2400" dirty="0"/>
+          </a:p>
+          <a:p>
+            <a:pPr lvl="1"/>
             <a:r>
               <a:rPr lang="en-US" sz="2400" dirty="0"/>
               <a:t>Missing from this data is information about deaths by age group which could assist more refined assessments of vulnerable populations </a:t>
             </a:r>
+          </a:p>
+          <a:p>
+            <a:pPr lvl="1"/>
+            <a:endParaRPr lang="en-US" sz="2400" dirty="0"/>
           </a:p>
           <a:p>
             <a:pPr lvl="1"/>
@@ -23262,6 +23289,36 @@
           </a:p>
         </p:txBody>
       </p:sp>
+      <p:pic>
+        <p:nvPicPr>
+          <p:cNvPr id="7" name="Picture 6">
+            <a:extLst>
+              <a:ext uri="{FF2B5EF4-FFF2-40B4-BE49-F238E27FC236}">
+                <a16:creationId xmlns:a16="http://schemas.microsoft.com/office/drawing/2014/main" id="{BA4337EE-5BA7-D269-00A0-2DB38730AD77}"/>
+              </a:ext>
+            </a:extLst>
+          </p:cNvPr>
+          <p:cNvPicPr>
+            <a:picLocks noChangeAspect="1"/>
+          </p:cNvPicPr>
+          <p:nvPr/>
+        </p:nvPicPr>
+        <p:blipFill>
+          <a:blip r:embed="rId2"/>
+          <a:stretch>
+            <a:fillRect/>
+          </a:stretch>
+        </p:blipFill>
+        <p:spPr>
+          <a:xfrm>
+            <a:off x="7224266" y="3725668"/>
+            <a:ext cx="3230686" cy="2716791"/>
+          </a:xfrm>
+          <a:prstGeom prst="rect">
+            <a:avLst/>
+          </a:prstGeom>
+        </p:spPr>
+      </p:pic>
     </p:spTree>
     <p:extLst>
       <p:ext uri="{BB962C8B-B14F-4D97-AF65-F5344CB8AC3E}">
@@ -23347,23 +23404,45 @@
           <a:lstStyle/>
           <a:p>
             <a:r>
-              <a:rPr lang="en-US" dirty="0"/>
+              <a:rPr lang="en-US" sz="2800" dirty="0"/>
               <a:t>35 Columns, 302,000 Rows</a:t>
             </a:r>
           </a:p>
           <a:p>
             <a:pPr lvl="1"/>
             <a:r>
-              <a:rPr lang="en-US" dirty="0"/>
+              <a:rPr lang="en-US" sz="2400" dirty="0"/>
               <a:t>By country data from 1/3/2020 to 4/12/2023</a:t>
             </a:r>
           </a:p>
           <a:p>
             <a:pPr lvl="1"/>
             <a:r>
-              <a:rPr lang="en-US" dirty="0"/>
+              <a:rPr lang="en-US" sz="2400" dirty="0"/>
               <a:t>Missing values required using weekly averages in analysis</a:t>
             </a:r>
+          </a:p>
+          <a:p>
+            <a:pPr lvl="1"/>
+            <a:r>
+              <a:rPr lang="en-US" sz="2400" dirty="0"/>
+              <a:t>Likelihood of underreporting or overreporting not explicitly addressed</a:t>
+            </a:r>
+          </a:p>
+          <a:p>
+            <a:pPr lvl="1"/>
+            <a:r>
+              <a:rPr lang="en-US" sz="2400" dirty="0"/>
+              <a:t>Overtime analysis uses weekly averages</a:t>
+            </a:r>
+          </a:p>
+          <a:p>
+            <a:pPr lvl="1"/>
+            <a:r>
+              <a:rPr lang="en-US" sz="2400" dirty="0"/>
+              <a:t>Total analysis uses total or highest values to return unique values</a:t>
+            </a:r>
+            <a:endParaRPr lang="en-US" dirty="0"/>
           </a:p>
           <a:p>
             <a:pPr lvl="1"/>
@@ -23405,6 +23484,35 @@
           <a:chExt cx="0" cy="0"/>
         </a:xfrm>
       </p:grpSpPr>
+      <p:pic>
+        <p:nvPicPr>
+          <p:cNvPr id="14" name="Content Placeholder 13" descr="A graph of different colored lines&#10;&#10;Description automatically generated">
+            <a:extLst>
+              <a:ext uri="{FF2B5EF4-FFF2-40B4-BE49-F238E27FC236}">
+                <a16:creationId xmlns:a16="http://schemas.microsoft.com/office/drawing/2014/main" id="{E7915B1B-3BDA-3485-1A30-C44A5E6D5CB3}"/>
+              </a:ext>
+            </a:extLst>
+          </p:cNvPr>
+          <p:cNvPicPr>
+            <a:picLocks noGrp="1" noChangeAspect="1"/>
+          </p:cNvPicPr>
+          <p:nvPr>
+            <p:ph idx="1"/>
+          </p:nvPr>
+        </p:nvPicPr>
+        <p:blipFill>
+          <a:blip r:embed="rId2"/>
+          <a:stretch>
+            <a:fillRect/>
+          </a:stretch>
+        </p:blipFill>
+        <p:spPr>
+          <a:xfrm>
+            <a:off x="1384678" y="1388841"/>
+            <a:ext cx="7058808" cy="5274468"/>
+          </a:xfrm>
+        </p:spPr>
+      </p:pic>
       <p:sp>
         <p:nvSpPr>
           <p:cNvPr id="2" name="Title 1">
@@ -23438,35 +23546,6 @@
           </a:p>
         </p:txBody>
       </p:sp>
-      <p:pic>
-        <p:nvPicPr>
-          <p:cNvPr id="5" name="Content Placeholder 4" descr="A graph of different colored lines&#10;&#10;Description automatically generated">
-            <a:extLst>
-              <a:ext uri="{FF2B5EF4-FFF2-40B4-BE49-F238E27FC236}">
-                <a16:creationId xmlns:a16="http://schemas.microsoft.com/office/drawing/2014/main" id="{43229D98-8411-3850-01A4-29AB7BA36EDC}"/>
-              </a:ext>
-            </a:extLst>
-          </p:cNvPr>
-          <p:cNvPicPr>
-            <a:picLocks noGrp="1" noChangeAspect="1"/>
-          </p:cNvPicPr>
-          <p:nvPr>
-            <p:ph idx="1"/>
-          </p:nvPr>
-        </p:nvPicPr>
-        <p:blipFill>
-          <a:blip r:embed="rId2"/>
-          <a:stretch>
-            <a:fillRect/>
-          </a:stretch>
-        </p:blipFill>
-        <p:spPr>
-          <a:xfrm>
-            <a:off x="1590675" y="1359027"/>
-            <a:ext cx="6768786" cy="5035423"/>
-          </a:xfrm>
-        </p:spPr>
-      </p:pic>
       <p:grpSp>
         <p:nvGrpSpPr>
           <p:cNvPr id="9" name="Group 8">
@@ -23482,9 +23561,9 @@
         <p:grpSpPr>
           <a:xfrm>
             <a:off x="7361852" y="1875453"/>
-            <a:ext cx="3592287" cy="646331"/>
+            <a:ext cx="3592287" cy="1200329"/>
             <a:chOff x="7361852" y="1875453"/>
-            <a:chExt cx="4245429" cy="646331"/>
+            <a:chExt cx="4245429" cy="1200329"/>
           </a:xfrm>
         </p:grpSpPr>
         <p:sp>
@@ -23502,7 +23581,7 @@
           <p:spPr>
             <a:xfrm>
               <a:off x="8640146" y="1875453"/>
-              <a:ext cx="2967135" cy="646331"/>
+              <a:ext cx="2967135" cy="1200329"/>
             </a:xfrm>
             <a:prstGeom prst="rect">
               <a:avLst/>
@@ -23521,7 +23600,7 @@
             <a:lstStyle/>
             <a:p>
               <a:r>
-                <a:rPr lang="en-US" dirty="0"/>
+                <a:rPr lang="en-US" sz="2400" dirty="0"/>
                 <a:t>Correlates with China’s “reopening”</a:t>
               </a:r>
             </a:p>
@@ -23597,9 +23676,9 @@
         <p:grpSpPr>
           <a:xfrm>
             <a:off x="4254760" y="4105884"/>
-            <a:ext cx="6634065" cy="451734"/>
+            <a:ext cx="6634065" cy="498389"/>
             <a:chOff x="4254760" y="4105884"/>
-            <a:chExt cx="6634065" cy="451734"/>
+            <a:chExt cx="6634065" cy="498389"/>
           </a:xfrm>
         </p:grpSpPr>
         <p:sp>
@@ -23617,7 +23696,7 @@
           <p:spPr>
             <a:xfrm>
               <a:off x="8443485" y="4137322"/>
-              <a:ext cx="2445340" cy="369332"/>
+              <a:ext cx="2445340" cy="461665"/>
             </a:xfrm>
             <a:prstGeom prst="rect">
               <a:avLst/>
@@ -23636,7 +23715,7 @@
             <a:lstStyle/>
             <a:p>
               <a:r>
-                <a:rPr lang="en-US" dirty="0"/>
+                <a:rPr lang="en-US" sz="2400" dirty="0"/>
                 <a:t>Seasonal spikes</a:t>
               </a:r>
             </a:p>
@@ -23710,7 +23789,7 @@
           </p:nvSpPr>
           <p:spPr>
             <a:xfrm>
-              <a:off x="4254760" y="4357606"/>
+              <a:off x="4254760" y="4404261"/>
               <a:ext cx="4188725" cy="200012"/>
             </a:xfrm>
             <a:prstGeom prst="leftArrow">
@@ -23761,6 +23840,126 @@
   <p:clrMapOvr>
     <a:masterClrMapping/>
   </p:clrMapOvr>
+  <p:timing>
+    <p:tnLst>
+      <p:par>
+        <p:cTn id="1" dur="indefinite" restart="never" nodeType="tmRoot">
+          <p:childTnLst>
+            <p:seq concurrent="1" nextAc="seek">
+              <p:cTn id="2" dur="indefinite" nodeType="mainSeq">
+                <p:childTnLst>
+                  <p:par>
+                    <p:cTn id="3" fill="hold">
+                      <p:stCondLst>
+                        <p:cond delay="indefinite"/>
+                      </p:stCondLst>
+                      <p:childTnLst>
+                        <p:par>
+                          <p:cTn id="4" fill="hold">
+                            <p:stCondLst>
+                              <p:cond delay="0"/>
+                            </p:stCondLst>
+                            <p:childTnLst>
+                              <p:par>
+                                <p:cTn id="5" presetID="1" presetClass="entr" presetSubtype="0" fill="hold" nodeType="clickEffect">
+                                  <p:stCondLst>
+                                    <p:cond delay="0"/>
+                                  </p:stCondLst>
+                                  <p:childTnLst>
+                                    <p:set>
+                                      <p:cBhvr>
+                                        <p:cTn id="6" dur="1" fill="hold">
+                                          <p:stCondLst>
+                                            <p:cond delay="0"/>
+                                          </p:stCondLst>
+                                        </p:cTn>
+                                        <p:tgtEl>
+                                          <p:spTgt spid="12"/>
+                                        </p:tgtEl>
+                                        <p:attrNameLst>
+                                          <p:attrName>style.visibility</p:attrName>
+                                        </p:attrNameLst>
+                                      </p:cBhvr>
+                                      <p:to>
+                                        <p:strVal val="visible"/>
+                                      </p:to>
+                                    </p:set>
+                                  </p:childTnLst>
+                                </p:cTn>
+                              </p:par>
+                            </p:childTnLst>
+                          </p:cTn>
+                        </p:par>
+                      </p:childTnLst>
+                    </p:cTn>
+                  </p:par>
+                  <p:par>
+                    <p:cTn id="7" fill="hold">
+                      <p:stCondLst>
+                        <p:cond delay="indefinite"/>
+                      </p:stCondLst>
+                      <p:childTnLst>
+                        <p:par>
+                          <p:cTn id="8" fill="hold">
+                            <p:stCondLst>
+                              <p:cond delay="0"/>
+                            </p:stCondLst>
+                            <p:childTnLst>
+                              <p:par>
+                                <p:cTn id="9" presetID="1" presetClass="entr" presetSubtype="0" fill="hold" nodeType="clickEffect">
+                                  <p:stCondLst>
+                                    <p:cond delay="0"/>
+                                  </p:stCondLst>
+                                  <p:childTnLst>
+                                    <p:set>
+                                      <p:cBhvr>
+                                        <p:cTn id="10" dur="1" fill="hold">
+                                          <p:stCondLst>
+                                            <p:cond delay="0"/>
+                                          </p:stCondLst>
+                                        </p:cTn>
+                                        <p:tgtEl>
+                                          <p:spTgt spid="9"/>
+                                        </p:tgtEl>
+                                        <p:attrNameLst>
+                                          <p:attrName>style.visibility</p:attrName>
+                                        </p:attrNameLst>
+                                      </p:cBhvr>
+                                      <p:to>
+                                        <p:strVal val="visible"/>
+                                      </p:to>
+                                    </p:set>
+                                  </p:childTnLst>
+                                </p:cTn>
+                              </p:par>
+                            </p:childTnLst>
+                          </p:cTn>
+                        </p:par>
+                      </p:childTnLst>
+                    </p:cTn>
+                  </p:par>
+                </p:childTnLst>
+              </p:cTn>
+              <p:prevCondLst>
+                <p:cond evt="onPrev" delay="0">
+                  <p:tgtEl>
+                    <p:sldTgt/>
+                  </p:tgtEl>
+                </p:cond>
+              </p:prevCondLst>
+              <p:nextCondLst>
+                <p:cond evt="onNext" delay="0">
+                  <p:tgtEl>
+                    <p:sldTgt/>
+                  </p:tgtEl>
+                </p:cond>
+              </p:nextCondLst>
+            </p:seq>
+          </p:childTnLst>
+        </p:cTn>
+      </p:par>
+    </p:tnLst>
+  </p:timing>
 </p:sld>
 </file>
 
@@ -23816,10 +24015,10 @@
       </p:sp>
       <p:pic>
         <p:nvPicPr>
-          <p:cNvPr id="5" name="Content Placeholder 4" descr="A graph of different colored lines&#10;&#10;Description automatically generated">
+          <p:cNvPr id="7" name="Content Placeholder 6" descr="A graph of different colored lines&#10;&#10;Description automatically generated">
             <a:extLst>
               <a:ext uri="{FF2B5EF4-FFF2-40B4-BE49-F238E27FC236}">
-                <a16:creationId xmlns:a16="http://schemas.microsoft.com/office/drawing/2014/main" id="{CFFA9DA4-0EEA-83D7-8CC9-867B276301FF}"/>
+                <a16:creationId xmlns:a16="http://schemas.microsoft.com/office/drawing/2014/main" id="{1ECA1C56-E9CF-418D-61CC-DCDBFF49AA3D}"/>
               </a:ext>
             </a:extLst>
           </p:cNvPr>
@@ -23838,11 +24037,51 @@
         </p:blipFill>
         <p:spPr>
           <a:xfrm>
-            <a:off x="818013" y="1781175"/>
-            <a:ext cx="6487662" cy="4826086"/>
+            <a:off x="1173745" y="1636356"/>
+            <a:ext cx="6627230" cy="4951985"/>
           </a:xfrm>
         </p:spPr>
       </p:pic>
+      <p:sp>
+        <p:nvSpPr>
+          <p:cNvPr id="8" name="TextBox 7">
+            <a:extLst>
+              <a:ext uri="{FF2B5EF4-FFF2-40B4-BE49-F238E27FC236}">
+                <a16:creationId xmlns:a16="http://schemas.microsoft.com/office/drawing/2014/main" id="{9D823FDD-B572-38E7-549B-093CC789AFF0}"/>
+              </a:ext>
+            </a:extLst>
+          </p:cNvPr>
+          <p:cNvSpPr txBox="1"/>
+          <p:nvPr/>
+        </p:nvSpPr>
+        <p:spPr>
+          <a:xfrm>
+            <a:off x="8118216" y="3230359"/>
+            <a:ext cx="3217280" cy="646331"/>
+          </a:xfrm>
+          <a:prstGeom prst="rect">
+            <a:avLst/>
+          </a:prstGeom>
+          <a:noFill/>
+          <a:ln>
+            <a:solidFill>
+              <a:schemeClr val="tx1"/>
+            </a:solidFill>
+          </a:ln>
+        </p:spPr>
+        <p:txBody>
+          <a:bodyPr wrap="square" rtlCol="0">
+            <a:spAutoFit/>
+          </a:bodyPr>
+          <a:lstStyle/>
+          <a:p>
+            <a:r>
+              <a:rPr lang="en-US" dirty="0"/>
+              <a:t>Deaths Per Million makes Brazil look like the worst performer</a:t>
+            </a:r>
+          </a:p>
+        </p:txBody>
+      </p:sp>
     </p:spTree>
     <p:extLst>
       <p:ext uri="{BB962C8B-B14F-4D97-AF65-F5344CB8AC3E}">
@@ -23925,11 +24164,201 @@
         </p:blipFill>
         <p:spPr>
           <a:xfrm>
-            <a:off x="2283113" y="1676400"/>
+            <a:off x="1648885" y="1629747"/>
             <a:ext cx="6584662" cy="4912368"/>
           </a:xfrm>
         </p:spPr>
       </p:pic>
+      <p:grpSp>
+        <p:nvGrpSpPr>
+          <p:cNvPr id="8" name="Group 7">
+            <a:extLst>
+              <a:ext uri="{FF2B5EF4-FFF2-40B4-BE49-F238E27FC236}">
+                <a16:creationId xmlns:a16="http://schemas.microsoft.com/office/drawing/2014/main" id="{BFD00756-4A44-0138-8700-12EFCF92F1C2}"/>
+              </a:ext>
+            </a:extLst>
+          </p:cNvPr>
+          <p:cNvGrpSpPr/>
+          <p:nvPr/>
+        </p:nvGrpSpPr>
+        <p:grpSpPr>
+          <a:xfrm>
+            <a:off x="5747658" y="2062337"/>
+            <a:ext cx="5811352" cy="1938992"/>
+            <a:chOff x="5747658" y="2062337"/>
+            <a:chExt cx="5811352" cy="1938992"/>
+          </a:xfrm>
+        </p:grpSpPr>
+        <p:grpSp>
+          <p:nvGrpSpPr>
+            <p:cNvPr id="3" name="Group 2">
+              <a:extLst>
+                <a:ext uri="{FF2B5EF4-FFF2-40B4-BE49-F238E27FC236}">
+                  <a16:creationId xmlns:a16="http://schemas.microsoft.com/office/drawing/2014/main" id="{1CF92C03-1BAF-45DB-D67B-4D7C13ADB70C}"/>
+                </a:ext>
+              </a:extLst>
+            </p:cNvPr>
+            <p:cNvGrpSpPr/>
+            <p:nvPr/>
+          </p:nvGrpSpPr>
+          <p:grpSpPr>
+            <a:xfrm>
+              <a:off x="5747658" y="2062337"/>
+              <a:ext cx="5811352" cy="1938992"/>
+              <a:chOff x="4309266" y="1962103"/>
+              <a:chExt cx="6867960" cy="1938992"/>
+            </a:xfrm>
+          </p:grpSpPr>
+          <p:sp>
+            <p:nvSpPr>
+              <p:cNvPr id="4" name="TextBox 3">
+                <a:extLst>
+                  <a:ext uri="{FF2B5EF4-FFF2-40B4-BE49-F238E27FC236}">
+                    <a16:creationId xmlns:a16="http://schemas.microsoft.com/office/drawing/2014/main" id="{F2EBCE8B-E492-884F-FE57-371AFAE0BE97}"/>
+                  </a:ext>
+                </a:extLst>
+              </p:cNvPr>
+              <p:cNvSpPr txBox="1"/>
+              <p:nvPr/>
+            </p:nvSpPr>
+            <p:spPr>
+              <a:xfrm>
+                <a:off x="8210091" y="1962103"/>
+                <a:ext cx="2967135" cy="1938992"/>
+              </a:xfrm>
+              <a:prstGeom prst="rect">
+                <a:avLst/>
+              </a:prstGeom>
+              <a:noFill/>
+              <a:ln>
+                <a:solidFill>
+                  <a:schemeClr val="tx1"/>
+                </a:solidFill>
+              </a:ln>
+            </p:spPr>
+            <p:txBody>
+              <a:bodyPr wrap="square" rtlCol="0">
+                <a:spAutoFit/>
+              </a:bodyPr>
+              <a:lstStyle/>
+              <a:p>
+                <a:r>
+                  <a:rPr lang="en-US" sz="2400" dirty="0"/>
+                  <a:t>Inconsistent reporting may indicate data contamination or bias</a:t>
+                </a:r>
+              </a:p>
+            </p:txBody>
+          </p:sp>
+          <p:sp>
+            <p:nvSpPr>
+              <p:cNvPr id="6" name="Arrow: Left 5">
+                <a:extLst>
+                  <a:ext uri="{FF2B5EF4-FFF2-40B4-BE49-F238E27FC236}">
+                    <a16:creationId xmlns:a16="http://schemas.microsoft.com/office/drawing/2014/main" id="{44656E79-98BF-C9B6-123A-11546CBDD44E}"/>
+                  </a:ext>
+                </a:extLst>
+              </p:cNvPr>
+              <p:cNvSpPr/>
+              <p:nvPr/>
+            </p:nvSpPr>
+            <p:spPr>
+              <a:xfrm>
+                <a:off x="4309266" y="1984598"/>
+                <a:ext cx="3900826" cy="238490"/>
+              </a:xfrm>
+              <a:prstGeom prst="leftArrow">
+                <a:avLst/>
+              </a:prstGeom>
+              <a:solidFill>
+                <a:schemeClr val="bg1"/>
+              </a:solidFill>
+              <a:ln>
+                <a:solidFill>
+                  <a:schemeClr val="tx1"/>
+                </a:solidFill>
+              </a:ln>
+            </p:spPr>
+            <p:style>
+              <a:lnRef idx="2">
+                <a:schemeClr val="accent1">
+                  <a:shade val="15000"/>
+                </a:schemeClr>
+              </a:lnRef>
+              <a:fillRef idx="1">
+                <a:schemeClr val="accent1"/>
+              </a:fillRef>
+              <a:effectRef idx="0">
+                <a:schemeClr val="accent1"/>
+              </a:effectRef>
+              <a:fontRef idx="minor">
+                <a:schemeClr val="lt1"/>
+              </a:fontRef>
+            </p:style>
+            <p:txBody>
+              <a:bodyPr rtlCol="0" anchor="ctr"/>
+              <a:lstStyle/>
+              <a:p>
+                <a:pPr algn="ctr"/>
+                <a:endParaRPr lang="en-US"/>
+              </a:p>
+            </p:txBody>
+          </p:sp>
+        </p:grpSp>
+        <p:sp>
+          <p:nvSpPr>
+            <p:cNvPr id="7" name="Arrow: Left 6">
+              <a:extLst>
+                <a:ext uri="{FF2B5EF4-FFF2-40B4-BE49-F238E27FC236}">
+                  <a16:creationId xmlns:a16="http://schemas.microsoft.com/office/drawing/2014/main" id="{9DD9B7BF-1677-3B1A-5B12-D1297370CBAE}"/>
+                </a:ext>
+              </a:extLst>
+            </p:cNvPr>
+            <p:cNvSpPr/>
+            <p:nvPr/>
+          </p:nvSpPr>
+          <p:spPr>
+            <a:xfrm>
+              <a:off x="7035283" y="3309755"/>
+              <a:ext cx="2013074" cy="238490"/>
+            </a:xfrm>
+            <a:prstGeom prst="leftArrow">
+              <a:avLst/>
+            </a:prstGeom>
+            <a:solidFill>
+              <a:schemeClr val="bg1"/>
+            </a:solidFill>
+            <a:ln>
+              <a:solidFill>
+                <a:schemeClr val="tx1"/>
+              </a:solidFill>
+            </a:ln>
+          </p:spPr>
+          <p:style>
+            <a:lnRef idx="2">
+              <a:schemeClr val="accent1">
+                <a:shade val="15000"/>
+              </a:schemeClr>
+            </a:lnRef>
+            <a:fillRef idx="1">
+              <a:schemeClr val="accent1"/>
+            </a:fillRef>
+            <a:effectRef idx="0">
+              <a:schemeClr val="accent1"/>
+            </a:effectRef>
+            <a:fontRef idx="minor">
+              <a:schemeClr val="lt1"/>
+            </a:fontRef>
+          </p:style>
+          <p:txBody>
+            <a:bodyPr rtlCol="0" anchor="ctr"/>
+            <a:lstStyle/>
+            <a:p>
+              <a:pPr algn="ctr"/>
+              <a:endParaRPr lang="en-US"/>
+            </a:p>
+          </p:txBody>
+        </p:sp>
+      </p:grpSp>
     </p:spTree>
     <p:extLst>
       <p:ext uri="{BB962C8B-B14F-4D97-AF65-F5344CB8AC3E}">
@@ -23940,6 +24369,81 @@
   <p:clrMapOvr>
     <a:masterClrMapping/>
   </p:clrMapOvr>
+  <p:timing>
+    <p:tnLst>
+      <p:par>
+        <p:cTn id="1" dur="indefinite" restart="never" nodeType="tmRoot">
+          <p:childTnLst>
+            <p:seq concurrent="1" nextAc="seek">
+              <p:cTn id="2" dur="indefinite" nodeType="mainSeq">
+                <p:childTnLst>
+                  <p:par>
+                    <p:cTn id="3" fill="hold">
+                      <p:stCondLst>
+                        <p:cond delay="indefinite"/>
+                      </p:stCondLst>
+                      <p:childTnLst>
+                        <p:par>
+                          <p:cTn id="4" fill="hold">
+                            <p:stCondLst>
+                              <p:cond delay="0"/>
+                            </p:stCondLst>
+                            <p:childTnLst>
+                              <p:par>
+                                <p:cTn id="5" presetID="1" presetClass="entr" presetSubtype="0" fill="hold" nodeType="clickEffect">
+                                  <p:stCondLst>
+                                    <p:cond delay="0"/>
+                                  </p:stCondLst>
+                                  <p:childTnLst>
+                                    <p:set>
+                                      <p:cBhvr>
+                                        <p:cTn id="6" dur="1" fill="hold">
+                                          <p:stCondLst>
+                                            <p:cond delay="0"/>
+                                          </p:stCondLst>
+                                        </p:cTn>
+                                        <p:tgtEl>
+                                          <p:spTgt spid="8"/>
+                                        </p:tgtEl>
+                                        <p:attrNameLst>
+                                          <p:attrName>style.visibility</p:attrName>
+                                        </p:attrNameLst>
+                                      </p:cBhvr>
+                                      <p:to>
+                                        <p:strVal val="visible"/>
+                                      </p:to>
+                                    </p:set>
+                                  </p:childTnLst>
+                                </p:cTn>
+                              </p:par>
+                            </p:childTnLst>
+                          </p:cTn>
+                        </p:par>
+                      </p:childTnLst>
+                    </p:cTn>
+                  </p:par>
+                </p:childTnLst>
+              </p:cTn>
+              <p:prevCondLst>
+                <p:cond evt="onPrev" delay="0">
+                  <p:tgtEl>
+                    <p:sldTgt/>
+                  </p:tgtEl>
+                </p:cond>
+              </p:prevCondLst>
+              <p:nextCondLst>
+                <p:cond evt="onNext" delay="0">
+                  <p:tgtEl>
+                    <p:sldTgt/>
+                  </p:tgtEl>
+                </p:cond>
+              </p:nextCondLst>
+            </p:seq>
+          </p:childTnLst>
+        </p:cTn>
+      </p:par>
+    </p:tnLst>
+  </p:timing>
 </p:sld>
 </file>
 
@@ -23976,14 +24480,28 @@
             <p:ph type="title"/>
           </p:nvPr>
         </p:nvSpPr>
-        <p:spPr/>
+        <p:spPr>
+          <a:xfrm>
+            <a:off x="930822" y="435180"/>
+            <a:ext cx="9720072" cy="1499616"/>
+          </a:xfrm>
+        </p:spPr>
         <p:txBody>
-          <a:bodyPr/>
+          <a:bodyPr>
+            <a:normAutofit fontScale="90000"/>
+          </a:bodyPr>
           <a:lstStyle/>
           <a:p>
             <a:r>
               <a:rPr lang="en-US" dirty="0"/>
-              <a:t>Correlation analysis: Did vaccination rates decrease death rates?</a:t>
+              <a:t>Hypothesis Test: </a:t>
+            </a:r>
+            <a:br>
+              <a:rPr lang="en-US" dirty="0"/>
+            </a:br>
+            <a:r>
+              <a:rPr lang="en-US" dirty="0"/>
+              <a:t>Did vaccination rates decrease death rates?</a:t>
             </a:r>
           </a:p>
         </p:txBody>
@@ -24006,9 +24524,14 @@
         </p:nvSpPr>
         <p:spPr>
           <a:xfrm>
-            <a:off x="646637" y="2271445"/>
-            <a:ext cx="5237525" cy="1408348"/>
+            <a:off x="404043" y="2172997"/>
+            <a:ext cx="5691958" cy="4129604"/>
           </a:xfrm>
+          <a:ln>
+            <a:solidFill>
+              <a:schemeClr val="tx1"/>
+            </a:solidFill>
+          </a:ln>
         </p:spPr>
         <p:txBody>
           <a:bodyPr>
@@ -24020,8 +24543,8 @@
               <a:buNone/>
             </a:pPr>
             <a:r>
-              <a:rPr lang="en-US" sz="1600" b="1" dirty="0"/>
-              <a:t>Hypothesis Test:</a:t>
+              <a:rPr lang="en-US" sz="1800" b="1" dirty="0"/>
+              <a:t>Hypothesis:</a:t>
             </a:r>
           </a:p>
           <a:p>
@@ -24029,7 +24552,7 @@
               <a:buNone/>
             </a:pPr>
             <a:r>
-              <a:rPr lang="en-US" sz="1600" dirty="0"/>
+              <a:rPr lang="en-US" sz="1800" dirty="0"/>
               <a:t>H0: Vaccination rates do not lower the death rate in a country.</a:t>
             </a:r>
           </a:p>
@@ -24038,19 +24561,77 @@
               <a:buNone/>
             </a:pPr>
             <a:r>
-              <a:rPr lang="en-US" sz="1600" dirty="0"/>
+              <a:rPr lang="en-US" sz="1800" dirty="0"/>
               <a:t>H</a:t>
             </a:r>
             <a:r>
-              <a:rPr lang="el-GR" sz="1600" dirty="0">
+              <a:rPr lang="el-GR" sz="1800" dirty="0">
                 <a:latin typeface="Times New Roman" panose="02020603050405020304" pitchFamily="18" charset="0"/>
                 <a:cs typeface="Times New Roman" panose="02020603050405020304" pitchFamily="18" charset="0"/>
               </a:rPr>
               <a:t>α</a:t>
             </a:r>
             <a:r>
-              <a:rPr lang="en-US" sz="1600" dirty="0"/>
+              <a:rPr lang="en-US" sz="1800" dirty="0"/>
               <a:t>: An increase in vaccination rates lowers the death rate in a country.</a:t>
+            </a:r>
+          </a:p>
+          <a:p>
+            <a:pPr marL="0" indent="0">
+              <a:buFont typeface="Tw Cen MT" panose="020B0602020104020603" pitchFamily="34" charset="0"/>
+              <a:buNone/>
+            </a:pPr>
+            <a:r>
+              <a:rPr lang="en-US" sz="1800" b="1" dirty="0"/>
+              <a:t>P-value: 0.002</a:t>
+            </a:r>
+            <a:br>
+              <a:rPr lang="en-US" sz="1800" b="1" dirty="0"/>
+            </a:br>
+            <a:endParaRPr lang="en-US" sz="1800" b="1" dirty="0"/>
+          </a:p>
+          <a:p>
+            <a:pPr marL="0" indent="0">
+              <a:buFont typeface="Tw Cen MT" panose="020B0602020104020603" pitchFamily="34" charset="0"/>
+              <a:buNone/>
+            </a:pPr>
+            <a:r>
+              <a:rPr lang="en-US" sz="1800" dirty="0"/>
+              <a:t>Statistical results suggest accepting H</a:t>
+            </a:r>
+            <a:r>
+              <a:rPr lang="el-GR" sz="1800" dirty="0">
+                <a:latin typeface="Times New Roman" panose="02020603050405020304" pitchFamily="18" charset="0"/>
+                <a:cs typeface="Times New Roman" panose="02020603050405020304" pitchFamily="18" charset="0"/>
+              </a:rPr>
+              <a:t>α</a:t>
+            </a:r>
+            <a:r>
+              <a:rPr lang="en-US" sz="1800" dirty="0">
+                <a:latin typeface="Times New Roman" panose="02020603050405020304" pitchFamily="18" charset="0"/>
+                <a:cs typeface="Times New Roman" panose="02020603050405020304" pitchFamily="18" charset="0"/>
+              </a:rPr>
+              <a:t> </a:t>
+            </a:r>
+            <a:r>
+              <a:rPr lang="en-US" sz="1800" dirty="0">
+                <a:cs typeface="Times New Roman" panose="02020603050405020304" pitchFamily="18" charset="0"/>
+              </a:rPr>
+              <a:t>within 95% confidence rating</a:t>
+            </a:r>
+            <a:r>
+              <a:rPr lang="en-US" sz="1800" dirty="0"/>
+              <a:t>.  </a:t>
+            </a:r>
+          </a:p>
+          <a:p>
+            <a:pPr marL="0" indent="0">
+              <a:buFont typeface="Tw Cen MT" panose="020B0602020104020603" pitchFamily="34" charset="0"/>
+              <a:buNone/>
+            </a:pPr>
+            <a:r>
+              <a:rPr lang="en-US" sz="1800" dirty="0"/>
+              <a:t>However, vaccination rates do not tell the entire story.</a:t>
             </a:r>
           </a:p>
         </p:txBody>
@@ -24101,8 +24682,8 @@
         </p:nvSpPr>
         <p:spPr>
           <a:xfrm>
-            <a:off x="646638" y="3800885"/>
-            <a:ext cx="5237525" cy="1872127"/>
+            <a:off x="404042" y="3819546"/>
+            <a:ext cx="5691958" cy="1872127"/>
           </a:xfrm>
           <a:prstGeom prst="rect">
             <a:avLst/>
@@ -24336,42 +24917,7 @@
               <a:buFont typeface="Tw Cen MT" panose="020B0602020104020603" pitchFamily="34" charset="0"/>
               <a:buNone/>
             </a:pPr>
-            <a:r>
-              <a:rPr lang="en-US" sz="1600" b="1" dirty="0"/>
-              <a:t>P-value: 0.002</a:t>
-            </a:r>
-            <a:br>
-              <a:rPr lang="en-US" sz="1600" b="1" dirty="0"/>
-            </a:br>
-            <a:r>
-              <a:rPr lang="en-US" sz="1600" b="1" dirty="0"/>
-              <a:t>R-squared</a:t>
-            </a:r>
-            <a:r>
-              <a:rPr lang="en-US" sz="1600" b="1"/>
-              <a:t>: 0.079</a:t>
-            </a:r>
-            <a:endParaRPr lang="en-US" sz="1600" b="1" dirty="0"/>
-          </a:p>
-          <a:p>
-            <a:pPr marL="0" indent="0">
-              <a:buFont typeface="Tw Cen MT" panose="020B0602020104020603" pitchFamily="34" charset="0"/>
-              <a:buNone/>
-            </a:pPr>
-            <a:r>
-              <a:rPr lang="en-US" sz="1600" dirty="0"/>
-              <a:t>These readings suggest that we can reject the null hypothesis.  </a:t>
-            </a:r>
-          </a:p>
-          <a:p>
-            <a:pPr marL="0" indent="0">
-              <a:buFont typeface="Tw Cen MT" panose="020B0602020104020603" pitchFamily="34" charset="0"/>
-              <a:buNone/>
-            </a:pPr>
-            <a:r>
-              <a:rPr lang="en-US" sz="1600" dirty="0"/>
-              <a:t>…But this is counter-intuitive to the data, and the low r-squared value suggests that other variables may affect deaths per million more than vaccination rates.</a:t>
-            </a:r>
+            <a:endParaRPr lang="en-US" sz="1600" dirty="0"/>
           </a:p>
         </p:txBody>
       </p:sp>
@@ -24485,12 +25031,17 @@
         </p:nvSpPr>
         <p:spPr>
           <a:xfrm>
-            <a:off x="534672" y="2765966"/>
+            <a:off x="432036" y="2511987"/>
             <a:ext cx="5237525" cy="1834025"/>
           </a:xfrm>
           <a:prstGeom prst="rect">
             <a:avLst/>
           </a:prstGeom>
+          <a:ln>
+            <a:solidFill>
+              <a:schemeClr val="tx1"/>
+            </a:solidFill>
+          </a:ln>
         </p:spPr>
         <p:txBody>
           <a:bodyPr vert="horz" lIns="45720" tIns="45720" rIns="45720" bIns="45720" rtlCol="0">
@@ -24721,8 +25272,16 @@
               <a:buNone/>
             </a:pPr>
             <a:r>
-              <a:rPr lang="en-US" sz="1600" dirty="0"/>
-              <a:t>Negatively correlated with extreme poverty</a:t>
+              <a:rPr lang="en-US" sz="1800" dirty="0"/>
+              <a:t>Total Deaths are </a:t>
+            </a:r>
+            <a:r>
+              <a:rPr lang="en-US" sz="1800" u="sng" dirty="0"/>
+              <a:t>negatively correlated </a:t>
+            </a:r>
+            <a:r>
+              <a:rPr lang="en-US" sz="1800" dirty="0"/>
+              <a:t>with extreme poverty</a:t>
             </a:r>
           </a:p>
           <a:p>
@@ -24731,15 +25290,13 @@
               <a:buNone/>
             </a:pPr>
             <a:r>
-              <a:rPr lang="en-US" sz="1600" dirty="0"/>
-              <a:t>Positively correlated with vaccination rates, increased age, wealthier nations, life expectancy, and human development</a:t>
+              <a:rPr lang="en-US" sz="1800" u="sng" dirty="0"/>
+              <a:t>Positively correlated </a:t>
             </a:r>
-          </a:p>
-          <a:p>
-            <a:pPr marL="0" indent="0">
-              <a:buFont typeface="Tw Cen MT" panose="020B0602020104020603" pitchFamily="34" charset="0"/>
-              <a:buNone/>
-            </a:pPr>
+            <a:r>
+              <a:rPr lang="en-US" sz="1800" dirty="0"/>
+              <a:t>with vaccination rates, increased age, wealthier nations, life expectancy, and human development</a:t>
+            </a:r>
             <a:endParaRPr lang="en-US" sz="1600" dirty="0"/>
           </a:p>
         </p:txBody>
@@ -25321,6 +25878,15 @@
 </file>
 
 <file path=customXml/item1.xml><?xml version="1.0" encoding="utf-8"?>
+<?mso-contentType ?>
+<FormTemplates xmlns="http://schemas.microsoft.com/sharepoint/v3/contenttype/forms">
+  <Display>DocumentLibraryForm</Display>
+  <Edit>DocumentLibraryForm</Edit>
+  <New>DocumentLibraryForm</New>
+</FormTemplates>
+</file>
+
+<file path=customXml/item2.xml><?xml version="1.0" encoding="utf-8"?>
 <ct:contentTypeSchema xmlns:ct="http://schemas.microsoft.com/office/2006/metadata/contentType" xmlns:ma="http://schemas.microsoft.com/office/2006/metadata/properties/metaAttributes" ct:_="" ma:_="" ma:contentTypeName="Document" ma:contentTypeID="0x01010079F111ED35F8CC479449609E8A0923A6" ma:contentTypeVersion="11" ma:contentTypeDescription="Create a new document." ma:contentTypeScope="" ma:versionID="9677210f24a1be23c92c90fd886aa0aa">
   <xsd:schema xmlns:xsd="http://www.w3.org/2001/XMLSchema" xmlns:xs="http://www.w3.org/2001/XMLSchema" xmlns:p="http://schemas.microsoft.com/office/2006/metadata/properties" xmlns:ns2="71af3243-3dd4-4a8d-8c0d-dd76da1f02a5" xmlns:ns3="16c05727-aa75-4e4a-9b5f-8a80a1165891" targetNamespace="http://schemas.microsoft.com/office/2006/metadata/properties" ma:root="true" ma:fieldsID="60e05723c5c1908df1a1a4ebf11d344e" ns2:_="" ns3:_="">
     <xsd:import namespace="71af3243-3dd4-4a8d-8c0d-dd76da1f02a5"/>
@@ -25531,15 +26097,6 @@
 </ct:contentTypeSchema>
 </file>
 
-<file path=customXml/item2.xml><?xml version="1.0" encoding="utf-8"?>
-<?mso-contentType ?>
-<FormTemplates xmlns="http://schemas.microsoft.com/sharepoint/v3/contenttype/forms">
-  <Display>DocumentLibraryForm</Display>
-  <Edit>DocumentLibraryForm</Edit>
-  <New>DocumentLibraryForm</New>
-</FormTemplates>
-</file>
-
 <file path=customXml/item3.xml><?xml version="1.0" encoding="utf-8"?>
 <p:properties xmlns:p="http://schemas.microsoft.com/office/2006/metadata/properties" xmlns:xsi="http://www.w3.org/2001/XMLSchema-instance" xmlns:pc="http://schemas.microsoft.com/office/infopath/2007/PartnerControls">
   <documentManagement>
@@ -25549,6 +26106,14 @@
 </file>
 
 <file path=customXml/itemProps1.xml><?xml version="1.0" encoding="utf-8"?>
+<ds:datastoreItem xmlns:ds="http://schemas.openxmlformats.org/officeDocument/2006/customXml" ds:itemID="{4F44C90D-2A62-4985-9618-3460247437B1}">
+  <ds:schemaRefs>
+    <ds:schemaRef ds:uri="http://schemas.microsoft.com/sharepoint/v3/contenttype/forms"/>
+  </ds:schemaRefs>
+</ds:datastoreItem>
+</file>
+
+<file path=customXml/itemProps2.xml><?xml version="1.0" encoding="utf-8"?>
 <ds:datastoreItem xmlns:ds="http://schemas.openxmlformats.org/officeDocument/2006/customXml" ds:itemID="{B61EAB5F-88FC-4FAE-AE3C-037A3C365EB8}">
   <ds:schemaRefs>
     <ds:schemaRef ds:uri="http://schemas.microsoft.com/office/2006/metadata/contentType"/>
@@ -25567,14 +26132,6 @@
 </ds:datastoreItem>
 </file>
 
-<file path=customXml/itemProps2.xml><?xml version="1.0" encoding="utf-8"?>
-<ds:datastoreItem xmlns:ds="http://schemas.openxmlformats.org/officeDocument/2006/customXml" ds:itemID="{4F44C90D-2A62-4985-9618-3460247437B1}">
-  <ds:schemaRefs>
-    <ds:schemaRef ds:uri="http://schemas.microsoft.com/sharepoint/v3/contenttype/forms"/>
-  </ds:schemaRefs>
-</ds:datastoreItem>
-</file>
-
 <file path=customXml/itemProps3.xml><?xml version="1.0" encoding="utf-8"?>
 <ds:datastoreItem xmlns:ds="http://schemas.openxmlformats.org/officeDocument/2006/customXml" ds:itemID="{788A2F88-55C5-4ED1-9541-807C65424763}">
   <ds:schemaRefs>

</xml_diff>

<commit_message>
Final revision to powerpoint.
</commit_message>
<xml_diff>
--- a/ppt/Covid Death Rates.pptx
+++ b/ppt/Covid Death Rates.pptx
@@ -210,7 +210,7 @@
           <a:p>
             <a:fld id="{C452ADB1-275D-430A-89EE-5C7E6CFF6FF2}" type="datetimeFigureOut">
               <a:rPr lang="en-US" smtClean="0"/>
-              <a:t>8/9/2023</a:t>
+              <a:t>8/11/2023</a:t>
             </a:fld>
             <a:endParaRPr lang="en-US" dirty="0"/>
           </a:p>
@@ -9270,7 +9270,7 @@
           <a:p>
             <a:fld id="{7005E26E-BCB2-4FD5-8FD5-81A5EAE94C21}" type="datetime1">
               <a:rPr lang="en-US" smtClean="0"/>
-              <a:t>8/9/2023</a:t>
+              <a:t>8/11/2023</a:t>
             </a:fld>
             <a:endParaRPr lang="en-US" dirty="0"/>
           </a:p>
@@ -9472,7 +9472,7 @@
           <a:p>
             <a:fld id="{9CC2E9B8-0487-42E4-B571-744A3D775783}" type="datetime1">
               <a:rPr lang="en-US" smtClean="0"/>
-              <a:t>8/9/2023</a:t>
+              <a:t>8/11/2023</a:t>
             </a:fld>
             <a:endParaRPr lang="en-US" dirty="0"/>
           </a:p>
@@ -9647,7 +9647,7 @@
           <a:p>
             <a:fld id="{9052E32D-1E84-43FD-8158-FFFE757EB0E8}" type="datetime1">
               <a:rPr lang="en-US" smtClean="0"/>
-              <a:t>8/9/2023</a:t>
+              <a:t>8/11/2023</a:t>
             </a:fld>
             <a:endParaRPr lang="en-US" dirty="0"/>
           </a:p>
@@ -9847,7 +9847,7 @@
           <a:p>
             <a:fld id="{8585C470-CD19-455C-B830-6D252EAD7FE5}" type="datetime1">
               <a:rPr lang="en-US" smtClean="0"/>
-              <a:t>8/9/2023</a:t>
+              <a:t>8/11/2023</a:t>
             </a:fld>
             <a:endParaRPr lang="en-US" dirty="0"/>
           </a:p>
@@ -18740,7 +18740,7 @@
           <a:p>
             <a:fld id="{7F85C43C-50D9-4F49-A136-0EFF292F93ED}" type="datetime1">
               <a:rPr lang="en-US" smtClean="0"/>
-              <a:t>8/9/2023</a:t>
+              <a:t>8/11/2023</a:t>
             </a:fld>
             <a:endParaRPr lang="en-US" dirty="0"/>
           </a:p>
@@ -19009,7 +19009,7 @@
           <a:p>
             <a:fld id="{7B53B1A3-0AEF-4064-A724-D27D660C8653}" type="datetime1">
               <a:rPr lang="en-US" smtClean="0"/>
-              <a:t>8/9/2023</a:t>
+              <a:t>8/11/2023</a:t>
             </a:fld>
             <a:endParaRPr lang="en-US" dirty="0"/>
           </a:p>
@@ -19402,7 +19402,7 @@
           <a:p>
             <a:fld id="{37D5D0F2-BF66-4A24-9384-A0129B196518}" type="datetime1">
               <a:rPr lang="en-US" smtClean="0"/>
-              <a:t>8/9/2023</a:t>
+              <a:t>8/11/2023</a:t>
             </a:fld>
             <a:endParaRPr lang="en-US" dirty="0"/>
           </a:p>
@@ -19515,7 +19515,7 @@
           <a:p>
             <a:fld id="{8C318A6C-4F6B-48D2-BDB0-D7413B3FDB0A}" type="datetime1">
               <a:rPr lang="en-US" smtClean="0"/>
-              <a:t>8/9/2023</a:t>
+              <a:t>8/11/2023</a:t>
             </a:fld>
             <a:endParaRPr lang="en-US" dirty="0"/>
           </a:p>
@@ -19605,7 +19605,7 @@
           <a:p>
             <a:fld id="{BF01ECED-6ECE-4989-B917-9D4D7E6D3C76}" type="datetime1">
               <a:rPr lang="en-US" smtClean="0"/>
-              <a:t>8/9/2023</a:t>
+              <a:t>8/11/2023</a:t>
             </a:fld>
             <a:endParaRPr lang="en-US" dirty="0"/>
           </a:p>
@@ -19890,7 +19890,7 @@
           <a:p>
             <a:fld id="{E3B570E1-CB40-488E-8C6F-EF4211DFFCB0}" type="datetime1">
               <a:rPr lang="en-US" smtClean="0"/>
-              <a:t>8/9/2023</a:t>
+              <a:t>8/11/2023</a:t>
             </a:fld>
             <a:endParaRPr lang="en-US" dirty="0"/>
           </a:p>
@@ -20165,7 +20165,7 @@
           <a:p>
             <a:fld id="{D1CEB6AF-9F5C-43BE-879E-CB9514111250}" type="datetime1">
               <a:rPr lang="en-US" smtClean="0"/>
-              <a:t>8/9/2023</a:t>
+              <a:t>8/11/2023</a:t>
             </a:fld>
             <a:endParaRPr lang="en-US" dirty="0"/>
           </a:p>
@@ -20410,7 +20410,7 @@
           <a:p>
             <a:fld id="{E7EE424C-FCA3-4EDD-B274-8E055D649B7D}" type="datetime1">
               <a:rPr lang="en-US" smtClean="0"/>
-              <a:t>8/9/2023</a:t>
+              <a:t>8/11/2023</a:t>
             </a:fld>
             <a:endParaRPr lang="en-US" dirty="0"/>
           </a:p>
@@ -22757,7 +22757,7 @@
             <a:pPr lvl="1"/>
             <a:r>
               <a:rPr lang="en-US" sz="2400" dirty="0"/>
-              <a:t>Efficacy of vaccinations statistically correlate with a decrease in total deaths, but this is not the only factor affecting death rates.</a:t>
+              <a:t>Vaccination percentages are not the only factor affecting death rates.</a:t>
             </a:r>
           </a:p>
           <a:p>
@@ -22768,7 +22768,7 @@
             <a:pPr lvl="1"/>
             <a:r>
               <a:rPr lang="en-US" sz="2400" dirty="0"/>
-              <a:t>Covid vaccination rates correlate with wealthier, more developed, and older populations which died at higher rates than poorer and younger populations.</a:t>
+              <a:t>Covid vaccination rates correlate with wealthier, more developed, and older populations which showed higher death rates than poorer and younger populations.</a:t>
             </a:r>
           </a:p>
           <a:p>
@@ -23278,13 +23278,6 @@
           </a:p>
           <a:p>
             <a:pPr lvl="1"/>
-            <a:r>
-              <a:rPr lang="en-US" sz="2400" dirty="0"/>
-              <a:t>Inform decision making by understanding at-risk societies</a:t>
-            </a:r>
-          </a:p>
-          <a:p>
-            <a:pPr lvl="1"/>
             <a:endParaRPr lang="en-US" dirty="0"/>
           </a:p>
         </p:txBody>
@@ -23433,13 +23426,6 @@
             <a:pPr lvl="1"/>
             <a:r>
               <a:rPr lang="en-US" sz="2400" dirty="0"/>
-              <a:t>Overtime analysis uses weekly averages</a:t>
-            </a:r>
-          </a:p>
-          <a:p>
-            <a:pPr lvl="1"/>
-            <a:r>
-              <a:rPr lang="en-US" sz="2400" dirty="0"/>
               <a:t>Total analysis uses total or highest values to return unique values</a:t>
             </a:r>
             <a:endParaRPr lang="en-US" dirty="0"/>
@@ -23541,7 +23527,7 @@
           <a:p>
             <a:r>
               <a:rPr lang="en-US" dirty="0"/>
-              <a:t>New cases over time</a:t>
+              <a:t>New covid cases over time</a:t>
             </a:r>
           </a:p>
         </p:txBody>
@@ -24488,7 +24474,7 @@
         </p:spPr>
         <p:txBody>
           <a:bodyPr>
-            <a:normAutofit fontScale="90000"/>
+            <a:normAutofit/>
           </a:bodyPr>
           <a:lstStyle/>
           <a:p>
@@ -24501,7 +24487,7 @@
             </a:br>
             <a:r>
               <a:rPr lang="en-US" dirty="0"/>
-              <a:t>Did vaccination rates decrease death rates?</a:t>
+              <a:t>Did vaccination rates Affect death rates?</a:t>
             </a:r>
           </a:p>
         </p:txBody>
@@ -24553,7 +24539,7 @@
             </a:pPr>
             <a:r>
               <a:rPr lang="en-US" sz="1800" dirty="0"/>
-              <a:t>H0: Vaccination rates do not lower the death rate in a country.</a:t>
+              <a:t>H0: Vaccination rates do not affect the death rate in a country.</a:t>
             </a:r>
           </a:p>
           <a:p>
@@ -24573,7 +24559,7 @@
             </a:r>
             <a:r>
               <a:rPr lang="en-US" sz="1800" dirty="0"/>
-              <a:t>: An increase in vaccination rates lowers the death rate in a country.</a:t>
+              <a:t>: Vaccination rates have an effect on a country’s death rate.</a:t>
             </a:r>
           </a:p>
           <a:p>
@@ -25031,7 +25017,7 @@
         </p:nvSpPr>
         <p:spPr>
           <a:xfrm>
-            <a:off x="432036" y="2511987"/>
+            <a:off x="413375" y="3429000"/>
             <a:ext cx="5237525" cy="1834025"/>
           </a:xfrm>
           <a:prstGeom prst="rect">

</xml_diff>